<commit_message>
2020.12.24 backend : groupmapper update, frontend : group view update
</commit_message>
<xml_diff>
--- a/projectProgressStatus/설계/UI/그룹/UI_그룹_윤기현_1.0.0.pptx
+++ b/projectProgressStatus/설계/UI/그룹/UI_그룹_윤기현_1.0.0.pptx
@@ -5,17 +5,18 @@
     <p:sldMasterId id="2147483648" r:id="rId1"/>
   </p:sldMasterIdLst>
   <p:sldIdLst>
-    <p:sldId id="263" r:id="rId2"/>
-    <p:sldId id="256" r:id="rId3"/>
-    <p:sldId id="257" r:id="rId4"/>
-    <p:sldId id="258" r:id="rId5"/>
-    <p:sldId id="266" r:id="rId6"/>
-    <p:sldId id="262" r:id="rId7"/>
-    <p:sldId id="259" r:id="rId8"/>
-    <p:sldId id="260" r:id="rId9"/>
-    <p:sldId id="264" r:id="rId10"/>
-    <p:sldId id="265" r:id="rId11"/>
-    <p:sldId id="261" r:id="rId12"/>
+    <p:sldId id="267" r:id="rId2"/>
+    <p:sldId id="263" r:id="rId3"/>
+    <p:sldId id="256" r:id="rId4"/>
+    <p:sldId id="257" r:id="rId5"/>
+    <p:sldId id="258" r:id="rId6"/>
+    <p:sldId id="266" r:id="rId7"/>
+    <p:sldId id="262" r:id="rId8"/>
+    <p:sldId id="259" r:id="rId9"/>
+    <p:sldId id="260" r:id="rId10"/>
+    <p:sldId id="264" r:id="rId11"/>
+    <p:sldId id="265" r:id="rId12"/>
+    <p:sldId id="261" r:id="rId13"/>
   </p:sldIdLst>
   <p:sldSz cx="12192000" cy="6858000"/>
   <p:notesSz cx="6858000" cy="9144000"/>
@@ -283,7 +284,7 @@
           <a:p>
             <a:fld id="{84F511B8-C531-40A9-9CDB-131CDE8750BA}" type="datetimeFigureOut">
               <a:rPr lang="ko-KR" altLang="en-US" smtClean="0"/>
-              <a:t>2020-12-10</a:t>
+              <a:t>2020-12-24</a:t>
             </a:fld>
             <a:endParaRPr lang="ko-KR" altLang="en-US"/>
           </a:p>
@@ -521,7 +522,7 @@
           <a:p>
             <a:fld id="{84F511B8-C531-40A9-9CDB-131CDE8750BA}" type="datetimeFigureOut">
               <a:rPr lang="ko-KR" altLang="en-US" smtClean="0"/>
-              <a:t>2020-12-10</a:t>
+              <a:t>2020-12-24</a:t>
             </a:fld>
             <a:endParaRPr lang="ko-KR" altLang="en-US"/>
           </a:p>
@@ -759,7 +760,7 @@
           <a:p>
             <a:fld id="{84F511B8-C531-40A9-9CDB-131CDE8750BA}" type="datetimeFigureOut">
               <a:rPr lang="ko-KR" altLang="en-US" smtClean="0"/>
-              <a:t>2020-12-10</a:t>
+              <a:t>2020-12-24</a:t>
             </a:fld>
             <a:endParaRPr lang="ko-KR" altLang="en-US"/>
           </a:p>
@@ -997,7 +998,7 @@
           <a:p>
             <a:fld id="{84F511B8-C531-40A9-9CDB-131CDE8750BA}" type="datetimeFigureOut">
               <a:rPr lang="ko-KR" altLang="en-US" smtClean="0"/>
-              <a:t>2020-12-10</a:t>
+              <a:t>2020-12-24</a:t>
             </a:fld>
             <a:endParaRPr lang="ko-KR" altLang="en-US"/>
           </a:p>
@@ -1302,7 +1303,7 @@
           <a:p>
             <a:fld id="{84F511B8-C531-40A9-9CDB-131CDE8750BA}" type="datetimeFigureOut">
               <a:rPr lang="ko-KR" altLang="en-US" smtClean="0"/>
-              <a:t>2020-12-10</a:t>
+              <a:t>2020-12-24</a:t>
             </a:fld>
             <a:endParaRPr lang="ko-KR" altLang="en-US"/>
           </a:p>
@@ -1605,7 +1606,7 @@
           <a:p>
             <a:fld id="{84F511B8-C531-40A9-9CDB-131CDE8750BA}" type="datetimeFigureOut">
               <a:rPr lang="ko-KR" altLang="en-US" smtClean="0"/>
-              <a:t>2020-12-10</a:t>
+              <a:t>2020-12-24</a:t>
             </a:fld>
             <a:endParaRPr lang="ko-KR" altLang="en-US"/>
           </a:p>
@@ -2056,7 +2057,7 @@
           <a:p>
             <a:fld id="{84F511B8-C531-40A9-9CDB-131CDE8750BA}" type="datetimeFigureOut">
               <a:rPr lang="ko-KR" altLang="en-US" smtClean="0"/>
-              <a:t>2020-12-10</a:t>
+              <a:t>2020-12-24</a:t>
             </a:fld>
             <a:endParaRPr lang="ko-KR" altLang="en-US"/>
           </a:p>
@@ -2229,7 +2230,7 @@
           <a:p>
             <a:fld id="{84F511B8-C531-40A9-9CDB-131CDE8750BA}" type="datetimeFigureOut">
               <a:rPr lang="ko-KR" altLang="en-US" smtClean="0"/>
-              <a:t>2020-12-10</a:t>
+              <a:t>2020-12-24</a:t>
             </a:fld>
             <a:endParaRPr lang="ko-KR" altLang="en-US"/>
           </a:p>
@@ -2366,7 +2367,7 @@
           <a:p>
             <a:fld id="{84F511B8-C531-40A9-9CDB-131CDE8750BA}" type="datetimeFigureOut">
               <a:rPr lang="ko-KR" altLang="en-US" smtClean="0"/>
-              <a:t>2020-12-10</a:t>
+              <a:t>2020-12-24</a:t>
             </a:fld>
             <a:endParaRPr lang="ko-KR" altLang="en-US"/>
           </a:p>
@@ -2710,7 +2711,7 @@
           <a:p>
             <a:fld id="{84F511B8-C531-40A9-9CDB-131CDE8750BA}" type="datetimeFigureOut">
               <a:rPr lang="ko-KR" altLang="en-US" smtClean="0"/>
-              <a:t>2020-12-10</a:t>
+              <a:t>2020-12-24</a:t>
             </a:fld>
             <a:endParaRPr lang="ko-KR" altLang="en-US"/>
           </a:p>
@@ -3031,7 +3032,7 @@
           <a:p>
             <a:fld id="{84F511B8-C531-40A9-9CDB-131CDE8750BA}" type="datetimeFigureOut">
               <a:rPr lang="ko-KR" altLang="en-US" smtClean="0"/>
-              <a:t>2020-12-10</a:t>
+              <a:t>2020-12-24</a:t>
             </a:fld>
             <a:endParaRPr lang="ko-KR" altLang="en-US"/>
           </a:p>
@@ -3509,10 +3510,10 @@
       </p:grpSpPr>
       <p:sp>
         <p:nvSpPr>
-          <p:cNvPr id="5" name="TextBox 4">
-            <a:extLst>
-              <a:ext uri="{FF2B5EF4-FFF2-40B4-BE49-F238E27FC236}">
-                <a16:creationId xmlns:a16="http://schemas.microsoft.com/office/drawing/2014/main" id="{1EF37BDE-B2E1-48B2-B091-E8439281D90D}"/>
+          <p:cNvPr id="27" name="TextBox 26">
+            <a:extLst>
+              <a:ext uri="{FF2B5EF4-FFF2-40B4-BE49-F238E27FC236}">
+                <a16:creationId xmlns:a16="http://schemas.microsoft.com/office/drawing/2014/main" id="{139FF448-95CA-426B-A5CC-B9F892EB2678}"/>
               </a:ext>
             </a:extLst>
           </p:cNvPr>
@@ -3521,7 +3522,7 @@
         </p:nvSpPr>
         <p:spPr>
           <a:xfrm>
-            <a:off x="1297577" y="1324121"/>
+            <a:off x="1297577" y="2100816"/>
             <a:ext cx="9596846" cy="923330"/>
           </a:xfrm>
           <a:prstGeom prst="rect">
@@ -3537,7 +3538,7 @@
           <a:p>
             <a:r>
               <a:rPr lang="ko-KR" altLang="en-US" dirty="0"/>
-              <a:t>그룹 생성</a:t>
+              <a:t>그룹</a:t>
             </a:r>
             <a:endParaRPr lang="en-US" altLang="ko-KR" dirty="0"/>
           </a:p>
@@ -3551,10 +3552,10 @@
       </p:sp>
       <p:sp>
         <p:nvSpPr>
-          <p:cNvPr id="6" name="직사각형 5">
-            <a:extLst>
-              <a:ext uri="{FF2B5EF4-FFF2-40B4-BE49-F238E27FC236}">
-                <a16:creationId xmlns:a16="http://schemas.microsoft.com/office/drawing/2014/main" id="{5ADB0028-D0CF-405E-A531-E45EB63ACD7E}"/>
+          <p:cNvPr id="28" name="직사각형 27">
+            <a:extLst>
+              <a:ext uri="{FF2B5EF4-FFF2-40B4-BE49-F238E27FC236}">
+                <a16:creationId xmlns:a16="http://schemas.microsoft.com/office/drawing/2014/main" id="{8E34CA2F-C9A4-4907-A0FB-3E9A759F719C}"/>
               </a:ext>
             </a:extLst>
           </p:cNvPr>
@@ -3563,8 +3564,8 @@
         </p:nvSpPr>
         <p:spPr>
           <a:xfrm>
-            <a:off x="1297577" y="1938072"/>
-            <a:ext cx="9596846" cy="2893174"/>
+            <a:off x="1297577" y="2714767"/>
+            <a:ext cx="9596846" cy="2111833"/>
           </a:xfrm>
           <a:prstGeom prst="rect">
             <a:avLst/>
@@ -3589,16 +3590,88 @@
           <a:lstStyle/>
           <a:p>
             <a:pPr algn="r"/>
+            <a:endParaRPr lang="en-US" altLang="ko-KR" sz="1200" dirty="0"/>
+          </a:p>
+          <a:p>
+            <a:pPr algn="r"/>
+            <a:endParaRPr lang="en-US" altLang="ko-KR" dirty="0"/>
+          </a:p>
+          <a:p>
+            <a:pPr algn="ctr"/>
+            <a:r>
+              <a:rPr lang="ko-KR" altLang="en-US" sz="1400" dirty="0"/>
+              <a:t>문제집 번호</a:t>
+            </a:r>
+            <a:r>
+              <a:rPr lang="en-US" altLang="ko-KR" sz="1400" dirty="0"/>
+              <a:t>  </a:t>
+            </a:r>
+            <a:r>
+              <a:rPr lang="ko-KR" altLang="en-US" sz="1400" dirty="0"/>
+              <a:t> </a:t>
+            </a:r>
+            <a:r>
+              <a:rPr lang="en-US" altLang="ko-KR" sz="1400" dirty="0"/>
+              <a:t>|          </a:t>
+            </a:r>
+            <a:r>
+              <a:rPr lang="ko-KR" altLang="en-US" sz="1400" dirty="0"/>
+              <a:t>분류</a:t>
+            </a:r>
+            <a:r>
+              <a:rPr lang="en-US" altLang="ko-KR" sz="1400" dirty="0"/>
+              <a:t>	</a:t>
+            </a:r>
+            <a:r>
+              <a:rPr lang="ko-KR" altLang="en-US" sz="1400" dirty="0"/>
+              <a:t> </a:t>
+            </a:r>
+            <a:r>
+              <a:rPr lang="en-US" altLang="ko-KR" sz="1400" dirty="0"/>
+              <a:t>|	</a:t>
+            </a:r>
+            <a:r>
+              <a:rPr lang="ko-KR" altLang="en-US" sz="1400" dirty="0"/>
+              <a:t>글 제목 </a:t>
+            </a:r>
+            <a:r>
+              <a:rPr lang="en-US" altLang="ko-KR" sz="1400" dirty="0"/>
+              <a:t>		|	 </a:t>
+            </a:r>
+            <a:r>
+              <a:rPr lang="ko-KR" altLang="en-US" sz="1400" dirty="0"/>
+              <a:t>작성자</a:t>
+            </a:r>
+            <a:r>
+              <a:rPr lang="en-US" altLang="ko-KR" sz="1400" dirty="0"/>
+              <a:t>	</a:t>
+            </a:r>
+            <a:r>
+              <a:rPr lang="ko-KR" altLang="en-US" sz="1400" dirty="0"/>
+              <a:t> </a:t>
+            </a:r>
+            <a:r>
+              <a:rPr lang="en-US" altLang="ko-KR" sz="1400" dirty="0"/>
+              <a:t>|	</a:t>
+            </a:r>
+            <a:r>
+              <a:rPr lang="ko-KR" altLang="en-US" sz="1400" dirty="0"/>
+              <a:t>작성 시간</a:t>
+            </a:r>
+            <a:r>
+              <a:rPr lang="en-US" altLang="ko-KR" sz="1400" dirty="0"/>
+              <a:t> </a:t>
+            </a:r>
             <a:endParaRPr lang="ko-KR" altLang="en-US" sz="1400" dirty="0"/>
           </a:p>
         </p:txBody>
       </p:sp>
       <p:sp>
         <p:nvSpPr>
-          <p:cNvPr id="7" name="직사각형 6">
-            <a:extLst>
-              <a:ext uri="{FF2B5EF4-FFF2-40B4-BE49-F238E27FC236}">
-                <a16:creationId xmlns:a16="http://schemas.microsoft.com/office/drawing/2014/main" id="{8D9DC2DA-2C2B-4B19-92FE-980B4818261E}"/>
+          <p:cNvPr id="29" name="직사각형 28">
+            <a:extLst>
+              <a:ext uri="{FF2B5EF4-FFF2-40B4-BE49-F238E27FC236}">
+                <a16:creationId xmlns:a16="http://schemas.microsoft.com/office/drawing/2014/main" id="{07F11B46-CBE6-4459-B93D-354654352AD5}"/>
               </a:ext>
             </a:extLst>
           </p:cNvPr>
@@ -3607,14 +3680,842 @@
         </p:nvSpPr>
         <p:spPr>
           <a:xfrm>
-            <a:off x="5044440" y="4471112"/>
-            <a:ext cx="680168" cy="300446"/>
+            <a:off x="1532709" y="3659871"/>
+            <a:ext cx="9117874" cy="296091"/>
           </a:xfrm>
           <a:prstGeom prst="rect">
             <a:avLst/>
           </a:prstGeom>
+        </p:spPr>
+        <p:style>
+          <a:lnRef idx="2">
+            <a:schemeClr val="accent1"/>
+          </a:lnRef>
+          <a:fillRef idx="1">
+            <a:schemeClr val="lt1"/>
+          </a:fillRef>
+          <a:effectRef idx="0">
+            <a:schemeClr val="accent1"/>
+          </a:effectRef>
+          <a:fontRef idx="minor">
+            <a:schemeClr val="dk1"/>
+          </a:fontRef>
+        </p:style>
+        <p:txBody>
+          <a:bodyPr rtlCol="0" anchor="ctr"/>
+          <a:lstStyle/>
+          <a:p>
+            <a:r>
+              <a:rPr lang="en-US" altLang="ko-KR" sz="1400" dirty="0"/>
+              <a:t>1	          </a:t>
+            </a:r>
+            <a:r>
+              <a:rPr lang="ko-KR" altLang="en-US" sz="1400" dirty="0"/>
+              <a:t>알고리즘                     문자열 탐색</a:t>
+            </a:r>
+            <a:r>
+              <a:rPr lang="en-US" altLang="ko-KR" sz="1400" dirty="0"/>
+              <a:t> 			</a:t>
+            </a:r>
+            <a:r>
+              <a:rPr lang="en-US" altLang="ko-KR" sz="1400" dirty="0" err="1"/>
+              <a:t>Ssafy</a:t>
+            </a:r>
+            <a:r>
+              <a:rPr lang="en-US" altLang="ko-KR" sz="1400" dirty="0"/>
+              <a:t>	    2020.12.09 11:11</a:t>
+            </a:r>
+            <a:endParaRPr lang="ko-KR" altLang="en-US" sz="1400" dirty="0"/>
+          </a:p>
+        </p:txBody>
+      </p:sp>
+      <p:sp>
+        <p:nvSpPr>
+          <p:cNvPr id="30" name="직사각형 29">
+            <a:extLst>
+              <a:ext uri="{FF2B5EF4-FFF2-40B4-BE49-F238E27FC236}">
+                <a16:creationId xmlns:a16="http://schemas.microsoft.com/office/drawing/2014/main" id="{903032CE-983B-49B4-BF4F-A0B45E786EC9}"/>
+              </a:ext>
+            </a:extLst>
+          </p:cNvPr>
+          <p:cNvSpPr/>
+          <p:nvPr/>
+        </p:nvSpPr>
+        <p:spPr>
+          <a:xfrm>
+            <a:off x="1532709" y="3955962"/>
+            <a:ext cx="9117874" cy="296091"/>
+          </a:xfrm>
+          <a:prstGeom prst="rect">
+            <a:avLst/>
+          </a:prstGeom>
+        </p:spPr>
+        <p:style>
+          <a:lnRef idx="2">
+            <a:schemeClr val="accent1"/>
+          </a:lnRef>
+          <a:fillRef idx="1">
+            <a:schemeClr val="lt1"/>
+          </a:fillRef>
+          <a:effectRef idx="0">
+            <a:schemeClr val="accent1"/>
+          </a:effectRef>
+          <a:fontRef idx="minor">
+            <a:schemeClr val="dk1"/>
+          </a:fontRef>
+        </p:style>
+        <p:txBody>
+          <a:bodyPr rtlCol="0" anchor="ctr"/>
+          <a:lstStyle/>
+          <a:p>
+            <a:r>
+              <a:rPr lang="en-US" altLang="ko-KR" sz="1400" dirty="0"/>
+              <a:t>2	          </a:t>
+            </a:r>
+            <a:r>
+              <a:rPr lang="ko-KR" altLang="en-US" sz="1400" dirty="0"/>
+              <a:t>자      바                     </a:t>
+            </a:r>
+            <a:r>
+              <a:rPr lang="en-US" altLang="ko-KR" sz="1400" dirty="0"/>
+              <a:t>Java</a:t>
+            </a:r>
+            <a:r>
+              <a:rPr lang="ko-KR" altLang="en-US" sz="1400" dirty="0"/>
+              <a:t> </a:t>
+            </a:r>
+            <a:r>
+              <a:rPr lang="en-US" altLang="ko-KR" sz="1400" dirty="0"/>
+              <a:t>OOP 			</a:t>
+            </a:r>
+            <a:r>
+              <a:rPr lang="en-US" altLang="ko-KR" sz="1400" dirty="0" err="1"/>
+              <a:t>Ssafy</a:t>
+            </a:r>
+            <a:r>
+              <a:rPr lang="en-US" altLang="ko-KR" sz="1400" dirty="0"/>
+              <a:t>	    2020.12.09 11:11</a:t>
+            </a:r>
+            <a:endParaRPr lang="ko-KR" altLang="en-US" sz="1400" dirty="0"/>
+          </a:p>
+        </p:txBody>
+      </p:sp>
+      <p:sp>
+        <p:nvSpPr>
+          <p:cNvPr id="31" name="직사각형 30">
+            <a:extLst>
+              <a:ext uri="{FF2B5EF4-FFF2-40B4-BE49-F238E27FC236}">
+                <a16:creationId xmlns:a16="http://schemas.microsoft.com/office/drawing/2014/main" id="{41B47295-7680-4DD7-8185-2ABB29250F28}"/>
+              </a:ext>
+            </a:extLst>
+          </p:cNvPr>
+          <p:cNvSpPr/>
+          <p:nvPr/>
+        </p:nvSpPr>
+        <p:spPr>
+          <a:xfrm>
+            <a:off x="1532709" y="4243235"/>
+            <a:ext cx="9117874" cy="296091"/>
+          </a:xfrm>
+          <a:prstGeom prst="rect">
+            <a:avLst/>
+          </a:prstGeom>
+        </p:spPr>
+        <p:style>
+          <a:lnRef idx="2">
+            <a:schemeClr val="accent1"/>
+          </a:lnRef>
+          <a:fillRef idx="1">
+            <a:schemeClr val="lt1"/>
+          </a:fillRef>
+          <a:effectRef idx="0">
+            <a:schemeClr val="accent1"/>
+          </a:effectRef>
+          <a:fontRef idx="minor">
+            <a:schemeClr val="dk1"/>
+          </a:fontRef>
+        </p:style>
+        <p:txBody>
+          <a:bodyPr rtlCol="0" anchor="ctr"/>
+          <a:lstStyle/>
+          <a:p>
+            <a:r>
+              <a:rPr lang="en-US" altLang="ko-KR" sz="1400" dirty="0"/>
+              <a:t>3	          Vue</a:t>
+            </a:r>
+            <a:r>
+              <a:rPr lang="ko-KR" altLang="en-US" sz="1400" dirty="0"/>
+              <a:t>                     </a:t>
+            </a:r>
+            <a:r>
+              <a:rPr lang="en-US" altLang="ko-KR" sz="1400" dirty="0"/>
+              <a:t>       </a:t>
+            </a:r>
+            <a:r>
+              <a:rPr lang="en-US" altLang="ko-KR" sz="1400" dirty="0" err="1"/>
+              <a:t>Vuex</a:t>
+            </a:r>
+            <a:r>
+              <a:rPr lang="en-US" altLang="ko-KR" sz="1400" dirty="0"/>
+              <a:t>			</a:t>
+            </a:r>
+            <a:r>
+              <a:rPr lang="en-US" altLang="ko-KR" sz="1400" dirty="0" err="1"/>
+              <a:t>Ssafy</a:t>
+            </a:r>
+            <a:r>
+              <a:rPr lang="en-US" altLang="ko-KR" sz="1400" dirty="0"/>
+              <a:t>	    2020.12.09 11:11</a:t>
+            </a:r>
+            <a:endParaRPr lang="ko-KR" altLang="en-US" sz="1400" dirty="0"/>
+          </a:p>
+        </p:txBody>
+      </p:sp>
+      <p:sp>
+        <p:nvSpPr>
+          <p:cNvPr id="32" name="직사각형 31">
+            <a:extLst>
+              <a:ext uri="{FF2B5EF4-FFF2-40B4-BE49-F238E27FC236}">
+                <a16:creationId xmlns:a16="http://schemas.microsoft.com/office/drawing/2014/main" id="{27638893-262B-4FEE-8225-67CDA3A324C7}"/>
+              </a:ext>
+            </a:extLst>
+          </p:cNvPr>
+          <p:cNvSpPr/>
+          <p:nvPr/>
+        </p:nvSpPr>
+        <p:spPr>
+          <a:xfrm>
+            <a:off x="4511040" y="5066086"/>
+            <a:ext cx="3448594" cy="300446"/>
+          </a:xfrm>
+          <a:prstGeom prst="rect">
+            <a:avLst/>
+          </a:prstGeom>
+        </p:spPr>
+        <p:style>
+          <a:lnRef idx="2">
+            <a:schemeClr val="accent1">
+              <a:shade val="50000"/>
+            </a:schemeClr>
+          </a:lnRef>
+          <a:fillRef idx="1">
+            <a:schemeClr val="accent1"/>
+          </a:fillRef>
+          <a:effectRef idx="0">
+            <a:schemeClr val="accent1"/>
+          </a:effectRef>
+          <a:fontRef idx="minor">
+            <a:schemeClr val="lt1"/>
+          </a:fontRef>
+        </p:style>
+        <p:txBody>
+          <a:bodyPr rtlCol="0" anchor="ctr"/>
+          <a:lstStyle/>
+          <a:p>
+            <a:pPr algn="ctr"/>
+            <a:r>
+              <a:rPr lang="ko-KR" altLang="en-US" dirty="0" err="1"/>
+              <a:t>페이징</a:t>
+            </a:r>
+            <a:endParaRPr lang="ko-KR" altLang="en-US" dirty="0"/>
+          </a:p>
+        </p:txBody>
+      </p:sp>
+      <p:sp>
+        <p:nvSpPr>
+          <p:cNvPr id="33" name="TextBox 32">
+            <a:extLst>
+              <a:ext uri="{FF2B5EF4-FFF2-40B4-BE49-F238E27FC236}">
+                <a16:creationId xmlns:a16="http://schemas.microsoft.com/office/drawing/2014/main" id="{9F14D135-E502-48F4-A761-C3EA7296E61F}"/>
+              </a:ext>
+            </a:extLst>
+          </p:cNvPr>
+          <p:cNvSpPr txBox="1"/>
+          <p:nvPr/>
+        </p:nvSpPr>
+        <p:spPr>
+          <a:xfrm>
+            <a:off x="8893345" y="2788981"/>
+            <a:ext cx="1461052" cy="276999"/>
+          </a:xfrm>
+          <a:prstGeom prst="rect">
+            <a:avLst/>
+          </a:prstGeom>
+        </p:spPr>
+        <p:style>
+          <a:lnRef idx="2">
+            <a:schemeClr val="accent1"/>
+          </a:lnRef>
+          <a:fillRef idx="1">
+            <a:schemeClr val="lt1"/>
+          </a:fillRef>
+          <a:effectRef idx="0">
+            <a:schemeClr val="accent1"/>
+          </a:effectRef>
+          <a:fontRef idx="minor">
+            <a:schemeClr val="dk1"/>
+          </a:fontRef>
+        </p:style>
+        <p:txBody>
+          <a:bodyPr wrap="square" rtlCol="0">
+            <a:spAutoFit/>
+          </a:bodyPr>
+          <a:lstStyle/>
+          <a:p>
+            <a:r>
+              <a:rPr lang="en-US" altLang="ko-KR" sz="1200" b="1" dirty="0">
+                <a:solidFill>
+                  <a:schemeClr val="bg1">
+                    <a:lumMod val="65000"/>
+                  </a:schemeClr>
+                </a:solidFill>
+              </a:rPr>
+              <a:t>Search</a:t>
+            </a:r>
+            <a:r>
+              <a:rPr lang="ko-KR" altLang="en-US" sz="1200" b="1" dirty="0">
+                <a:solidFill>
+                  <a:schemeClr val="bg1">
+                    <a:lumMod val="65000"/>
+                  </a:schemeClr>
+                </a:solidFill>
+              </a:rPr>
+              <a:t> </a:t>
+            </a:r>
+            <a:endParaRPr lang="en-US" altLang="ko-KR" sz="1200" b="1" dirty="0">
+              <a:solidFill>
+                <a:schemeClr val="bg1">
+                  <a:lumMod val="65000"/>
+                </a:schemeClr>
+              </a:solidFill>
+            </a:endParaRPr>
+          </a:p>
+        </p:txBody>
+      </p:sp>
+      <p:sp>
+        <p:nvSpPr>
+          <p:cNvPr id="34" name="TextBox 33">
+            <a:extLst>
+              <a:ext uri="{FF2B5EF4-FFF2-40B4-BE49-F238E27FC236}">
+                <a16:creationId xmlns:a16="http://schemas.microsoft.com/office/drawing/2014/main" id="{5F87EBC3-A396-4C75-B67F-674D59958F67}"/>
+              </a:ext>
+            </a:extLst>
+          </p:cNvPr>
+          <p:cNvSpPr txBox="1"/>
+          <p:nvPr/>
+        </p:nvSpPr>
+        <p:spPr>
+          <a:xfrm>
+            <a:off x="10354397" y="2788981"/>
+            <a:ext cx="540026" cy="276999"/>
+          </a:xfrm>
+          <a:prstGeom prst="rect">
+            <a:avLst/>
+          </a:prstGeom>
+        </p:spPr>
+        <p:style>
+          <a:lnRef idx="2">
+            <a:schemeClr val="accent6">
+              <a:shade val="50000"/>
+            </a:schemeClr>
+          </a:lnRef>
+          <a:fillRef idx="1">
+            <a:schemeClr val="accent6"/>
+          </a:fillRef>
+          <a:effectRef idx="0">
+            <a:schemeClr val="accent6"/>
+          </a:effectRef>
+          <a:fontRef idx="minor">
+            <a:schemeClr val="lt1"/>
+          </a:fontRef>
+        </p:style>
+        <p:txBody>
+          <a:bodyPr wrap="square" rtlCol="0">
+            <a:spAutoFit/>
+          </a:bodyPr>
+          <a:lstStyle/>
+          <a:p>
+            <a:pPr algn="ctr"/>
+            <a:r>
+              <a:rPr lang="ko-KR" altLang="en-US" sz="1200" b="1" dirty="0">
+                <a:solidFill>
+                  <a:schemeClr val="tx1"/>
+                </a:solidFill>
+              </a:rPr>
+              <a:t>검색</a:t>
+            </a:r>
+            <a:endParaRPr lang="en-US" altLang="ko-KR" sz="1200" b="1" dirty="0">
+              <a:solidFill>
+                <a:schemeClr val="tx1"/>
+              </a:solidFill>
+            </a:endParaRPr>
+          </a:p>
+        </p:txBody>
+      </p:sp>
+      <p:sp>
+        <p:nvSpPr>
+          <p:cNvPr id="35" name="직사각형 34">
+            <a:extLst>
+              <a:ext uri="{FF2B5EF4-FFF2-40B4-BE49-F238E27FC236}">
+                <a16:creationId xmlns:a16="http://schemas.microsoft.com/office/drawing/2014/main" id="{A3CE8F16-4B15-4D67-A16E-2DBFC8A7E396}"/>
+              </a:ext>
+            </a:extLst>
+          </p:cNvPr>
+          <p:cNvSpPr/>
+          <p:nvPr/>
+        </p:nvSpPr>
+        <p:spPr>
+          <a:xfrm>
+            <a:off x="1297577" y="2714767"/>
+            <a:ext cx="9596846" cy="2893174"/>
+          </a:xfrm>
+          <a:prstGeom prst="rect">
+            <a:avLst/>
+          </a:prstGeom>
+        </p:spPr>
+        <p:style>
+          <a:lnRef idx="2">
+            <a:schemeClr val="accent1"/>
+          </a:lnRef>
+          <a:fillRef idx="1">
+            <a:schemeClr val="lt1"/>
+          </a:fillRef>
+          <a:effectRef idx="0">
+            <a:schemeClr val="accent1"/>
+          </a:effectRef>
+          <a:fontRef idx="minor">
+            <a:schemeClr val="dk1"/>
+          </a:fontRef>
+        </p:style>
+        <p:txBody>
+          <a:bodyPr rtlCol="0" anchor="t"/>
+          <a:lstStyle/>
+          <a:p>
+            <a:pPr algn="r"/>
+            <a:endParaRPr lang="ko-KR" altLang="en-US" sz="1400" dirty="0"/>
+          </a:p>
+        </p:txBody>
+      </p:sp>
+      <p:sp>
+        <p:nvSpPr>
+          <p:cNvPr id="36" name="직사각형 35">
+            <a:extLst>
+              <a:ext uri="{FF2B5EF4-FFF2-40B4-BE49-F238E27FC236}">
+                <a16:creationId xmlns:a16="http://schemas.microsoft.com/office/drawing/2014/main" id="{83923495-93B5-4D1C-B9F1-25A44B8016B4}"/>
+              </a:ext>
+            </a:extLst>
+          </p:cNvPr>
+          <p:cNvSpPr/>
+          <p:nvPr/>
+        </p:nvSpPr>
+        <p:spPr>
+          <a:xfrm>
+            <a:off x="4511040" y="5066086"/>
+            <a:ext cx="3448594" cy="300446"/>
+          </a:xfrm>
+          <a:prstGeom prst="rect">
+            <a:avLst/>
+          </a:prstGeom>
+        </p:spPr>
+        <p:style>
+          <a:lnRef idx="2">
+            <a:schemeClr val="accent1"/>
+          </a:lnRef>
+          <a:fillRef idx="1">
+            <a:schemeClr val="lt1"/>
+          </a:fillRef>
+          <a:effectRef idx="0">
+            <a:schemeClr val="accent1"/>
+          </a:effectRef>
+          <a:fontRef idx="minor">
+            <a:schemeClr val="dk1"/>
+          </a:fontRef>
+        </p:style>
+        <p:txBody>
+          <a:bodyPr rtlCol="0" anchor="ctr"/>
+          <a:lstStyle/>
+          <a:p>
+            <a:pPr algn="ctr"/>
+            <a:r>
+              <a:rPr lang="ko-KR" altLang="en-US" dirty="0" err="1"/>
+              <a:t>페이징</a:t>
+            </a:r>
+            <a:endParaRPr lang="ko-KR" altLang="en-US" dirty="0"/>
+          </a:p>
+        </p:txBody>
+      </p:sp>
+      <p:sp>
+        <p:nvSpPr>
+          <p:cNvPr id="37" name="TextBox 36">
+            <a:extLst>
+              <a:ext uri="{FF2B5EF4-FFF2-40B4-BE49-F238E27FC236}">
+                <a16:creationId xmlns:a16="http://schemas.microsoft.com/office/drawing/2014/main" id="{76AB2BEC-958A-4A00-8EF6-D96072C1A240}"/>
+              </a:ext>
+            </a:extLst>
+          </p:cNvPr>
+          <p:cNvSpPr txBox="1"/>
+          <p:nvPr/>
+        </p:nvSpPr>
+        <p:spPr>
+          <a:xfrm>
+            <a:off x="8893345" y="2788981"/>
+            <a:ext cx="1461052" cy="276999"/>
+          </a:xfrm>
+          <a:prstGeom prst="rect">
+            <a:avLst/>
+          </a:prstGeom>
+        </p:spPr>
+        <p:style>
+          <a:lnRef idx="2">
+            <a:schemeClr val="accent1"/>
+          </a:lnRef>
+          <a:fillRef idx="1">
+            <a:schemeClr val="lt1"/>
+          </a:fillRef>
+          <a:effectRef idx="0">
+            <a:schemeClr val="accent1"/>
+          </a:effectRef>
+          <a:fontRef idx="minor">
+            <a:schemeClr val="dk1"/>
+          </a:fontRef>
+        </p:style>
+        <p:txBody>
+          <a:bodyPr wrap="square" rtlCol="0">
+            <a:spAutoFit/>
+          </a:bodyPr>
+          <a:lstStyle/>
+          <a:p>
+            <a:r>
+              <a:rPr lang="en-US" altLang="ko-KR" sz="1200" b="1" dirty="0">
+                <a:solidFill>
+                  <a:schemeClr val="bg1">
+                    <a:lumMod val="65000"/>
+                  </a:schemeClr>
+                </a:solidFill>
+              </a:rPr>
+              <a:t>Search</a:t>
+            </a:r>
+            <a:r>
+              <a:rPr lang="ko-KR" altLang="en-US" sz="1200" b="1" dirty="0">
+                <a:solidFill>
+                  <a:schemeClr val="bg1">
+                    <a:lumMod val="65000"/>
+                  </a:schemeClr>
+                </a:solidFill>
+              </a:rPr>
+              <a:t> </a:t>
+            </a:r>
+            <a:endParaRPr lang="en-US" altLang="ko-KR" sz="1200" b="1" dirty="0">
+              <a:solidFill>
+                <a:schemeClr val="bg1">
+                  <a:lumMod val="65000"/>
+                </a:schemeClr>
+              </a:solidFill>
+            </a:endParaRPr>
+          </a:p>
+        </p:txBody>
+      </p:sp>
+      <p:graphicFrame>
+        <p:nvGraphicFramePr>
+          <p:cNvPr id="39" name="표 2">
+            <a:extLst>
+              <a:ext uri="{FF2B5EF4-FFF2-40B4-BE49-F238E27FC236}">
+                <a16:creationId xmlns:a16="http://schemas.microsoft.com/office/drawing/2014/main" id="{3DC780D0-CF79-4DC7-A937-00EBBA7AEB88}"/>
+              </a:ext>
+            </a:extLst>
+          </p:cNvPr>
+          <p:cNvGraphicFramePr>
+            <a:graphicFrameLocks noGrp="1"/>
+          </p:cNvGraphicFramePr>
+          <p:nvPr>
+            <p:extLst>
+              <p:ext uri="{D42A27DB-BD31-4B8C-83A1-F6EECF244321}">
+                <p14:modId xmlns:p14="http://schemas.microsoft.com/office/powerpoint/2010/main" val="2710520573"/>
+              </p:ext>
+            </p:extLst>
+          </p:nvPr>
+        </p:nvGraphicFramePr>
+        <p:xfrm>
+          <a:off x="1532711" y="3419674"/>
+          <a:ext cx="8821686" cy="1483360"/>
+        </p:xfrm>
+        <a:graphic>
+          <a:graphicData uri="http://schemas.openxmlformats.org/drawingml/2006/table">
+            <a:tbl>
+              <a:tblPr firstRow="1" bandRow="1">
+                <a:tableStyleId>{D27102A9-8310-4765-A935-A1911B00CA55}</a:tableStyleId>
+              </a:tblPr>
+              <a:tblGrid>
+                <a:gridCol w="1186285">
+                  <a:extLst>
+                    <a:ext uri="{9D8B030D-6E8A-4147-A177-3AD203B41FA5}">
+                      <a16:colId xmlns:a16="http://schemas.microsoft.com/office/drawing/2014/main" val="215400847"/>
+                    </a:ext>
+                  </a:extLst>
+                </a:gridCol>
+                <a:gridCol w="4730153">
+                  <a:extLst>
+                    <a:ext uri="{9D8B030D-6E8A-4147-A177-3AD203B41FA5}">
+                      <a16:colId xmlns:a16="http://schemas.microsoft.com/office/drawing/2014/main" val="2866296187"/>
+                    </a:ext>
+                  </a:extLst>
+                </a:gridCol>
+                <a:gridCol w="2905248">
+                  <a:extLst>
+                    <a:ext uri="{9D8B030D-6E8A-4147-A177-3AD203B41FA5}">
+                      <a16:colId xmlns:a16="http://schemas.microsoft.com/office/drawing/2014/main" val="2193912149"/>
+                    </a:ext>
+                  </a:extLst>
+                </a:gridCol>
+              </a:tblGrid>
+              <a:tr h="370840">
+                <a:tc>
+                  <a:txBody>
+                    <a:bodyPr/>
+                    <a:lstStyle/>
+                    <a:p>
+                      <a:pPr algn="ctr" latinLnBrk="1"/>
+                      <a:r>
+                        <a:rPr lang="ko-KR" altLang="en-US" sz="1100" dirty="0"/>
+                        <a:t>그룹 번호</a:t>
+                      </a:r>
+                    </a:p>
+                  </a:txBody>
+                  <a:tcPr anchor="ctr"/>
+                </a:tc>
+                <a:tc>
+                  <a:txBody>
+                    <a:bodyPr/>
+                    <a:lstStyle/>
+                    <a:p>
+                      <a:pPr algn="ctr" latinLnBrk="1"/>
+                      <a:r>
+                        <a:rPr lang="ko-KR" altLang="en-US" sz="1100" dirty="0" err="1"/>
+                        <a:t>그룹명</a:t>
+                      </a:r>
+                      <a:endParaRPr lang="ko-KR" altLang="en-US" sz="1100" dirty="0"/>
+                    </a:p>
+                  </a:txBody>
+                  <a:tcPr anchor="ctr"/>
+                </a:tc>
+                <a:tc>
+                  <a:txBody>
+                    <a:bodyPr/>
+                    <a:lstStyle/>
+                    <a:p>
+                      <a:pPr algn="ctr" latinLnBrk="1"/>
+                      <a:r>
+                        <a:rPr lang="ko-KR" altLang="en-US" sz="1100" dirty="0"/>
+                        <a:t>타입</a:t>
+                      </a:r>
+                    </a:p>
+                  </a:txBody>
+                  <a:tcPr anchor="ctr"/>
+                </a:tc>
+                <a:extLst>
+                  <a:ext uri="{0D108BD9-81ED-4DB2-BD59-A6C34878D82A}">
+                    <a16:rowId xmlns:a16="http://schemas.microsoft.com/office/drawing/2014/main" val="3674311876"/>
+                  </a:ext>
+                </a:extLst>
+              </a:tr>
+              <a:tr h="370840">
+                <a:tc>
+                  <a:txBody>
+                    <a:bodyPr/>
+                    <a:lstStyle/>
+                    <a:p>
+                      <a:pPr algn="ctr" latinLnBrk="1"/>
+                      <a:r>
+                        <a:rPr lang="en-US" altLang="ko-KR" sz="1100" dirty="0"/>
+                        <a:t>1</a:t>
+                      </a:r>
+                      <a:endParaRPr lang="ko-KR" altLang="en-US" sz="1100" dirty="0"/>
+                    </a:p>
+                  </a:txBody>
+                  <a:tcPr anchor="ctr"/>
+                </a:tc>
+                <a:tc>
+                  <a:txBody>
+                    <a:bodyPr/>
+                    <a:lstStyle/>
+                    <a:p>
+                      <a:pPr algn="ctr" latinLnBrk="1"/>
+                      <a:r>
+                        <a:rPr lang="en-US" altLang="ko-KR" sz="1100" dirty="0"/>
+                        <a:t>SOLAFY</a:t>
+                      </a:r>
+                      <a:r>
+                        <a:rPr lang="ko-KR" altLang="en-US" sz="1100" dirty="0"/>
+                        <a:t> 공지 </a:t>
+                      </a:r>
+                      <a:r>
+                        <a:rPr lang="en-US" altLang="ko-KR" sz="1100" dirty="0"/>
+                        <a:t>1</a:t>
+                      </a:r>
+                      <a:endParaRPr lang="ko-KR" altLang="en-US" sz="1100" dirty="0"/>
+                    </a:p>
+                  </a:txBody>
+                  <a:tcPr anchor="ctr"/>
+                </a:tc>
+                <a:tc>
+                  <a:txBody>
+                    <a:bodyPr/>
+                    <a:lstStyle/>
+                    <a:p>
+                      <a:pPr algn="ctr" latinLnBrk="1"/>
+                      <a:r>
+                        <a:rPr lang="en-US" altLang="ko-KR" sz="1100" dirty="0"/>
+                        <a:t>SSAFY</a:t>
+                      </a:r>
+                      <a:endParaRPr lang="ko-KR" altLang="en-US" sz="1100" dirty="0"/>
+                    </a:p>
+                  </a:txBody>
+                  <a:tcPr anchor="ctr"/>
+                </a:tc>
+                <a:extLst>
+                  <a:ext uri="{0D108BD9-81ED-4DB2-BD59-A6C34878D82A}">
+                    <a16:rowId xmlns:a16="http://schemas.microsoft.com/office/drawing/2014/main" val="584801299"/>
+                  </a:ext>
+                </a:extLst>
+              </a:tr>
+              <a:tr h="370840">
+                <a:tc>
+                  <a:txBody>
+                    <a:bodyPr/>
+                    <a:lstStyle/>
+                    <a:p>
+                      <a:pPr algn="ctr" latinLnBrk="1"/>
+                      <a:r>
+                        <a:rPr lang="en-US" altLang="ko-KR" sz="1100" dirty="0"/>
+                        <a:t>2.</a:t>
+                      </a:r>
+                      <a:endParaRPr lang="ko-KR" altLang="en-US" sz="1100" dirty="0"/>
+                    </a:p>
+                  </a:txBody>
+                  <a:tcPr anchor="ctr"/>
+                </a:tc>
+                <a:tc>
+                  <a:txBody>
+                    <a:bodyPr/>
+                    <a:lstStyle/>
+                    <a:p>
+                      <a:pPr algn="ctr" latinLnBrk="1"/>
+                      <a:r>
+                        <a:rPr lang="ko-KR" altLang="en-US" sz="1100" dirty="0"/>
+                        <a:t>공지 </a:t>
+                      </a:r>
+                      <a:r>
+                        <a:rPr lang="en-US" altLang="ko-KR" sz="1100" dirty="0"/>
+                        <a:t>2</a:t>
+                      </a:r>
+                      <a:endParaRPr lang="ko-KR" altLang="en-US" sz="1100" dirty="0"/>
+                    </a:p>
+                  </a:txBody>
+                  <a:tcPr anchor="ctr"/>
+                </a:tc>
+                <a:tc>
+                  <a:txBody>
+                    <a:bodyPr/>
+                    <a:lstStyle/>
+                    <a:p>
+                      <a:pPr algn="ctr" latinLnBrk="1"/>
+                      <a:r>
+                        <a:rPr lang="en-US" altLang="ko-KR" sz="1100" dirty="0"/>
+                        <a:t>SSAFY</a:t>
+                      </a:r>
+                      <a:endParaRPr lang="ko-KR" altLang="en-US" sz="1100" dirty="0"/>
+                    </a:p>
+                  </a:txBody>
+                  <a:tcPr anchor="ctr"/>
+                </a:tc>
+                <a:extLst>
+                  <a:ext uri="{0D108BD9-81ED-4DB2-BD59-A6C34878D82A}">
+                    <a16:rowId xmlns:a16="http://schemas.microsoft.com/office/drawing/2014/main" val="3544151988"/>
+                  </a:ext>
+                </a:extLst>
+              </a:tr>
+              <a:tr h="370840">
+                <a:tc>
+                  <a:txBody>
+                    <a:bodyPr/>
+                    <a:lstStyle/>
+                    <a:p>
+                      <a:pPr algn="ctr" latinLnBrk="1"/>
+                      <a:r>
+                        <a:rPr lang="en-US" altLang="ko-KR" sz="1100" dirty="0"/>
+                        <a:t>3.</a:t>
+                      </a:r>
+                      <a:endParaRPr lang="ko-KR" altLang="en-US" sz="1100" dirty="0"/>
+                    </a:p>
+                  </a:txBody>
+                  <a:tcPr anchor="ctr"/>
+                </a:tc>
+                <a:tc>
+                  <a:txBody>
+                    <a:bodyPr/>
+                    <a:lstStyle/>
+                    <a:p>
+                      <a:pPr algn="ctr" latinLnBrk="1"/>
+                      <a:r>
+                        <a:rPr lang="ko-KR" altLang="en-US" sz="1100" dirty="0"/>
+                        <a:t>공지 </a:t>
+                      </a:r>
+                      <a:r>
+                        <a:rPr lang="en-US" altLang="ko-KR" sz="1100" dirty="0"/>
+                        <a:t>3</a:t>
+                      </a:r>
+                      <a:endParaRPr lang="ko-KR" altLang="en-US" sz="1100" dirty="0"/>
+                    </a:p>
+                  </a:txBody>
+                  <a:tcPr anchor="ctr"/>
+                </a:tc>
+                <a:tc>
+                  <a:txBody>
+                    <a:bodyPr/>
+                    <a:lstStyle/>
+                    <a:p>
+                      <a:pPr algn="ctr" latinLnBrk="1"/>
+                      <a:r>
+                        <a:rPr lang="en-US" altLang="ko-KR" sz="1100" dirty="0"/>
+                        <a:t>SSAFY</a:t>
+                      </a:r>
+                      <a:endParaRPr lang="ko-KR" altLang="en-US" sz="1100" dirty="0"/>
+                    </a:p>
+                  </a:txBody>
+                  <a:tcPr anchor="ctr"/>
+                </a:tc>
+                <a:extLst>
+                  <a:ext uri="{0D108BD9-81ED-4DB2-BD59-A6C34878D82A}">
+                    <a16:rowId xmlns:a16="http://schemas.microsoft.com/office/drawing/2014/main" val="3680400248"/>
+                  </a:ext>
+                </a:extLst>
+              </a:tr>
+            </a:tbl>
+          </a:graphicData>
+        </a:graphic>
+      </p:graphicFrame>
+      <p:sp>
+        <p:nvSpPr>
+          <p:cNvPr id="41" name="TextBox 40">
+            <a:extLst>
+              <a:ext uri="{FF2B5EF4-FFF2-40B4-BE49-F238E27FC236}">
+                <a16:creationId xmlns:a16="http://schemas.microsoft.com/office/drawing/2014/main" id="{04C23470-9AEC-4DC2-A6F7-18D2E66DFB3B}"/>
+              </a:ext>
+            </a:extLst>
+          </p:cNvPr>
+          <p:cNvSpPr txBox="1"/>
+          <p:nvPr/>
+        </p:nvSpPr>
+        <p:spPr>
+          <a:xfrm>
+            <a:off x="10354397" y="2788981"/>
+            <a:ext cx="540026" cy="276999"/>
+          </a:xfrm>
+          <a:prstGeom prst="rect">
+            <a:avLst/>
+          </a:prstGeom>
           <a:solidFill>
-            <a:schemeClr val="accent6"/>
+            <a:schemeClr val="accent4"/>
           </a:solidFill>
           <a:ln>
             <a:noFill/>
@@ -3635,23 +4536,672 @@
           </a:fontRef>
         </p:style>
         <p:txBody>
+          <a:bodyPr wrap="square" rtlCol="0">
+            <a:spAutoFit/>
+          </a:bodyPr>
+          <a:lstStyle/>
+          <a:p>
+            <a:pPr algn="ctr"/>
+            <a:r>
+              <a:rPr lang="ko-KR" altLang="en-US" sz="1200" b="1" dirty="0">
+                <a:solidFill>
+                  <a:schemeClr val="bg1"/>
+                </a:solidFill>
+              </a:rPr>
+              <a:t>검색</a:t>
+            </a:r>
+            <a:endParaRPr lang="en-US" altLang="ko-KR" sz="1200" b="1" dirty="0">
+              <a:solidFill>
+                <a:schemeClr val="bg1"/>
+              </a:solidFill>
+            </a:endParaRPr>
+          </a:p>
+        </p:txBody>
+      </p:sp>
+      <p:sp>
+        <p:nvSpPr>
+          <p:cNvPr id="17" name="TextBox 16">
+            <a:extLst>
+              <a:ext uri="{FF2B5EF4-FFF2-40B4-BE49-F238E27FC236}">
+                <a16:creationId xmlns:a16="http://schemas.microsoft.com/office/drawing/2014/main" id="{8A5440D3-64F4-4603-ACA4-27FE27458231}"/>
+              </a:ext>
+            </a:extLst>
+          </p:cNvPr>
+          <p:cNvSpPr txBox="1"/>
+          <p:nvPr/>
+        </p:nvSpPr>
+        <p:spPr>
+          <a:xfrm>
+            <a:off x="7229108" y="2788981"/>
+            <a:ext cx="1461052" cy="276999"/>
+          </a:xfrm>
+          <a:prstGeom prst="rect">
+            <a:avLst/>
+          </a:prstGeom>
+        </p:spPr>
+        <p:style>
+          <a:lnRef idx="2">
+            <a:schemeClr val="accent1"/>
+          </a:lnRef>
+          <a:fillRef idx="1">
+            <a:schemeClr val="lt1"/>
+          </a:fillRef>
+          <a:effectRef idx="0">
+            <a:schemeClr val="accent1"/>
+          </a:effectRef>
+          <a:fontRef idx="minor">
+            <a:schemeClr val="dk1"/>
+          </a:fontRef>
+        </p:style>
+        <p:txBody>
+          <a:bodyPr wrap="square" rtlCol="0">
+            <a:spAutoFit/>
+          </a:bodyPr>
+          <a:lstStyle/>
+          <a:p>
+            <a:r>
+              <a:rPr lang="ko-KR" altLang="en-US" sz="1200" b="1" dirty="0">
+                <a:solidFill>
+                  <a:schemeClr val="bg1">
+                    <a:lumMod val="65000"/>
+                  </a:schemeClr>
+                </a:solidFill>
+              </a:rPr>
+              <a:t>전체 검색</a:t>
+            </a:r>
+            <a:endParaRPr lang="en-US" altLang="ko-KR" sz="1200" b="1" dirty="0">
+              <a:solidFill>
+                <a:schemeClr val="bg1">
+                  <a:lumMod val="65000"/>
+                </a:schemeClr>
+              </a:solidFill>
+            </a:endParaRPr>
+          </a:p>
+        </p:txBody>
+      </p:sp>
+      <p:sp>
+        <p:nvSpPr>
+          <p:cNvPr id="18" name="이등변 삼각형 17">
+            <a:extLst>
+              <a:ext uri="{FF2B5EF4-FFF2-40B4-BE49-F238E27FC236}">
+                <a16:creationId xmlns:a16="http://schemas.microsoft.com/office/drawing/2014/main" id="{13F29BCB-FE3A-46B5-94E7-1C2B4369F05D}"/>
+              </a:ext>
+            </a:extLst>
+          </p:cNvPr>
+          <p:cNvSpPr/>
+          <p:nvPr/>
+        </p:nvSpPr>
+        <p:spPr>
+          <a:xfrm rot="10800000">
+            <a:off x="8463139" y="2850127"/>
+            <a:ext cx="209550" cy="180647"/>
+          </a:xfrm>
+          <a:prstGeom prst="triangle">
+            <a:avLst/>
+          </a:prstGeom>
+          <a:solidFill>
+            <a:schemeClr val="accent4"/>
+          </a:solidFill>
+          <a:ln>
+            <a:noFill/>
+          </a:ln>
+        </p:spPr>
+        <p:style>
+          <a:lnRef idx="0">
+            <a:scrgbClr r="0" g="0" b="0"/>
+          </a:lnRef>
+          <a:fillRef idx="0">
+            <a:scrgbClr r="0" g="0" b="0"/>
+          </a:fillRef>
+          <a:effectRef idx="0">
+            <a:scrgbClr r="0" g="0" b="0"/>
+          </a:effectRef>
+          <a:fontRef idx="minor">
+            <a:schemeClr val="lt1"/>
+          </a:fontRef>
+        </p:style>
+        <p:txBody>
           <a:bodyPr rtlCol="0" anchor="ctr"/>
           <a:lstStyle/>
           <a:p>
             <a:pPr algn="ctr"/>
+            <a:endParaRPr lang="ko-KR" altLang="en-US"/>
+          </a:p>
+        </p:txBody>
+      </p:sp>
+    </p:spTree>
+    <p:extLst>
+      <p:ext uri="{BB962C8B-B14F-4D97-AF65-F5344CB8AC3E}">
+        <p14:creationId xmlns:p14="http://schemas.microsoft.com/office/powerpoint/2010/main" val="1452918587"/>
+      </p:ext>
+    </p:extLst>
+  </p:cSld>
+  <p:clrMapOvr>
+    <a:masterClrMapping/>
+  </p:clrMapOvr>
+</p:sld>
+</file>
+
+<file path=ppt/slides/slide10.xml><?xml version="1.0" encoding="utf-8"?>
+<p:sld xmlns:a="http://schemas.openxmlformats.org/drawingml/2006/main" xmlns:r="http://schemas.openxmlformats.org/officeDocument/2006/relationships" xmlns:p="http://schemas.openxmlformats.org/presentationml/2006/main">
+  <p:cSld>
+    <p:spTree>
+      <p:nvGrpSpPr>
+        <p:cNvPr id="1" name=""/>
+        <p:cNvGrpSpPr/>
+        <p:nvPr/>
+      </p:nvGrpSpPr>
+      <p:grpSpPr>
+        <a:xfrm>
+          <a:off x="0" y="0"/>
+          <a:ext cx="0" cy="0"/>
+          <a:chOff x="0" y="0"/>
+          <a:chExt cx="0" cy="0"/>
+        </a:xfrm>
+      </p:grpSpPr>
+      <p:sp>
+        <p:nvSpPr>
+          <p:cNvPr id="4" name="직사각형 3">
+            <a:extLst>
+              <a:ext uri="{FF2B5EF4-FFF2-40B4-BE49-F238E27FC236}">
+                <a16:creationId xmlns:a16="http://schemas.microsoft.com/office/drawing/2014/main" id="{B1D1296F-1DCE-45BE-A689-E665097A2AEA}"/>
+              </a:ext>
+            </a:extLst>
+          </p:cNvPr>
+          <p:cNvSpPr/>
+          <p:nvPr/>
+        </p:nvSpPr>
+        <p:spPr>
+          <a:xfrm>
+            <a:off x="1402269" y="2102999"/>
+            <a:ext cx="9596846" cy="613951"/>
+          </a:xfrm>
+          <a:prstGeom prst="rect">
+            <a:avLst/>
+          </a:prstGeom>
+        </p:spPr>
+        <p:style>
+          <a:lnRef idx="2">
+            <a:schemeClr val="dk1"/>
+          </a:lnRef>
+          <a:fillRef idx="1">
+            <a:schemeClr val="lt1"/>
+          </a:fillRef>
+          <a:effectRef idx="0">
+            <a:schemeClr val="dk1"/>
+          </a:effectRef>
+          <a:fontRef idx="minor">
+            <a:schemeClr val="dk1"/>
+          </a:fontRef>
+        </p:style>
+        <p:txBody>
+          <a:bodyPr rtlCol="0" anchor="ctr"/>
+          <a:lstStyle/>
+          <a:p>
+            <a:pPr algn="ctr"/>
+            <a:r>
+              <a:rPr lang="ko-KR" altLang="en-US" sz="1200" dirty="0"/>
+              <a:t>그룹 공지</a:t>
+            </a:r>
+            <a:r>
+              <a:rPr lang="en-US" altLang="ko-KR" sz="1200" dirty="0"/>
+              <a:t>  | </a:t>
+            </a:r>
+            <a:r>
+              <a:rPr lang="ko-KR" altLang="en-US" sz="1200" dirty="0"/>
+              <a:t>그룹 문제집 </a:t>
+            </a:r>
+            <a:r>
+              <a:rPr lang="en-US" altLang="ko-KR" sz="1200" dirty="0"/>
+              <a:t>| </a:t>
+            </a:r>
+            <a:r>
+              <a:rPr lang="ko-KR" altLang="en-US" sz="1200" dirty="0"/>
+              <a:t>문제</a:t>
+            </a:r>
+            <a:r>
+              <a:rPr lang="en-US" altLang="ko-KR" sz="1200" dirty="0"/>
+              <a:t> </a:t>
+            </a:r>
+            <a:r>
+              <a:rPr lang="ko-KR" altLang="en-US" sz="1200" dirty="0"/>
+              <a:t>대회</a:t>
+            </a:r>
+            <a:r>
+              <a:rPr lang="en-US" altLang="ko-KR" sz="1200" dirty="0"/>
+              <a:t> | </a:t>
+            </a:r>
+            <a:r>
+              <a:rPr lang="ko-KR" altLang="en-US" sz="1200" dirty="0" err="1">
+                <a:solidFill>
+                  <a:schemeClr val="tx1"/>
+                </a:solidFill>
+              </a:rPr>
+              <a:t>그룹원</a:t>
+            </a:r>
+            <a:r>
+              <a:rPr lang="ko-KR" altLang="en-US" sz="1200" dirty="0">
+                <a:solidFill>
+                  <a:schemeClr val="tx1"/>
+                </a:solidFill>
+              </a:rPr>
+              <a:t> 보기 </a:t>
+            </a:r>
+            <a:r>
+              <a:rPr lang="en-US" altLang="ko-KR" sz="1200" dirty="0">
+                <a:solidFill>
+                  <a:schemeClr val="tx1"/>
+                </a:solidFill>
+              </a:rPr>
+              <a:t> </a:t>
+            </a:r>
+            <a:r>
+              <a:rPr lang="en-US" altLang="ko-KR" sz="1200" dirty="0"/>
+              <a:t>|  </a:t>
+            </a:r>
+            <a:r>
+              <a:rPr lang="ko-KR" altLang="en-US" sz="1200" b="1" dirty="0">
+                <a:solidFill>
+                  <a:srgbClr val="00B0F0"/>
+                </a:solidFill>
+              </a:rPr>
+              <a:t>그룹 수정</a:t>
+            </a:r>
+            <a:r>
+              <a:rPr lang="en-US" altLang="ko-KR" sz="1200" dirty="0"/>
+              <a:t>(</a:t>
+            </a:r>
+            <a:r>
+              <a:rPr lang="ko-KR" altLang="en-US" sz="1200" dirty="0"/>
+              <a:t>관리자의 경우</a:t>
+            </a:r>
+            <a:r>
+              <a:rPr lang="en-US" altLang="ko-KR" sz="1200" dirty="0"/>
+              <a:t>)</a:t>
+            </a:r>
+            <a:endParaRPr lang="ko-KR" altLang="en-US" sz="1200" dirty="0"/>
+          </a:p>
+        </p:txBody>
+      </p:sp>
+      <p:sp>
+        <p:nvSpPr>
+          <p:cNvPr id="5" name="TextBox 4">
+            <a:extLst>
+              <a:ext uri="{FF2B5EF4-FFF2-40B4-BE49-F238E27FC236}">
+                <a16:creationId xmlns:a16="http://schemas.microsoft.com/office/drawing/2014/main" id="{1EF37BDE-B2E1-48B2-B091-E8439281D90D}"/>
+              </a:ext>
+            </a:extLst>
+          </p:cNvPr>
+          <p:cNvSpPr txBox="1"/>
+          <p:nvPr/>
+        </p:nvSpPr>
+        <p:spPr>
+          <a:xfrm>
+            <a:off x="1402269" y="2943371"/>
+            <a:ext cx="9596846" cy="923330"/>
+          </a:xfrm>
+          <a:prstGeom prst="rect">
+            <a:avLst/>
+          </a:prstGeom>
+          <a:noFill/>
+        </p:spPr>
+        <p:txBody>
+          <a:bodyPr wrap="square" rtlCol="0">
+            <a:spAutoFit/>
+          </a:bodyPr>
+          <a:lstStyle/>
+          <a:p>
+            <a:r>
+              <a:rPr lang="ko-KR" altLang="en-US" dirty="0"/>
+              <a:t>그룹 수정</a:t>
+            </a:r>
+            <a:endParaRPr lang="en-US" altLang="ko-KR" dirty="0"/>
+          </a:p>
+          <a:p>
+            <a:endParaRPr lang="en-US" altLang="ko-KR" dirty="0"/>
+          </a:p>
+          <a:p>
+            <a:endParaRPr lang="ko-KR" altLang="en-US" dirty="0"/>
+          </a:p>
+        </p:txBody>
+      </p:sp>
+      <p:sp>
+        <p:nvSpPr>
+          <p:cNvPr id="6" name="직사각형 5">
+            <a:extLst>
+              <a:ext uri="{FF2B5EF4-FFF2-40B4-BE49-F238E27FC236}">
+                <a16:creationId xmlns:a16="http://schemas.microsoft.com/office/drawing/2014/main" id="{5ADB0028-D0CF-405E-A531-E45EB63ACD7E}"/>
+              </a:ext>
+            </a:extLst>
+          </p:cNvPr>
+          <p:cNvSpPr/>
+          <p:nvPr/>
+        </p:nvSpPr>
+        <p:spPr>
+          <a:xfrm>
+            <a:off x="1402269" y="3785922"/>
+            <a:ext cx="9596846" cy="3072078"/>
+          </a:xfrm>
+          <a:prstGeom prst="rect">
+            <a:avLst/>
+          </a:prstGeom>
+        </p:spPr>
+        <p:style>
+          <a:lnRef idx="2">
+            <a:schemeClr val="accent1"/>
+          </a:lnRef>
+          <a:fillRef idx="1">
+            <a:schemeClr val="lt1"/>
+          </a:fillRef>
+          <a:effectRef idx="0">
+            <a:schemeClr val="accent1"/>
+          </a:effectRef>
+          <a:fontRef idx="minor">
+            <a:schemeClr val="dk1"/>
+          </a:fontRef>
+        </p:style>
+        <p:txBody>
+          <a:bodyPr rtlCol="0" anchor="t"/>
+          <a:lstStyle/>
+          <a:p>
+            <a:pPr algn="r"/>
+            <a:endParaRPr lang="ko-KR" altLang="en-US" sz="1400" dirty="0"/>
+          </a:p>
+        </p:txBody>
+      </p:sp>
+      <p:sp>
+        <p:nvSpPr>
+          <p:cNvPr id="7" name="직사각형 6">
+            <a:extLst>
+              <a:ext uri="{FF2B5EF4-FFF2-40B4-BE49-F238E27FC236}">
+                <a16:creationId xmlns:a16="http://schemas.microsoft.com/office/drawing/2014/main" id="{8D9DC2DA-2C2B-4B19-92FE-980B4818261E}"/>
+              </a:ext>
+            </a:extLst>
+          </p:cNvPr>
+          <p:cNvSpPr/>
+          <p:nvPr/>
+        </p:nvSpPr>
+        <p:spPr>
+          <a:xfrm>
+            <a:off x="5131715" y="6472893"/>
+            <a:ext cx="680168" cy="300446"/>
+          </a:xfrm>
+          <a:prstGeom prst="rect">
+            <a:avLst/>
+          </a:prstGeom>
+          <a:solidFill>
+            <a:schemeClr val="accent6"/>
+          </a:solidFill>
+          <a:ln>
+            <a:noFill/>
+          </a:ln>
+        </p:spPr>
+        <p:style>
+          <a:lnRef idx="0">
+            <a:scrgbClr r="0" g="0" b="0"/>
+          </a:lnRef>
+          <a:fillRef idx="0">
+            <a:scrgbClr r="0" g="0" b="0"/>
+          </a:fillRef>
+          <a:effectRef idx="0">
+            <a:scrgbClr r="0" g="0" b="0"/>
+          </a:effectRef>
+          <a:fontRef idx="minor">
+            <a:schemeClr val="lt1"/>
+          </a:fontRef>
+        </p:style>
+        <p:txBody>
+          <a:bodyPr rtlCol="0" anchor="ctr"/>
+          <a:lstStyle/>
+          <a:p>
+            <a:pPr algn="ctr"/>
             <a:r>
               <a:rPr lang="ko-KR" altLang="en-US" sz="1200" b="1" dirty="0"/>
-              <a:t>생성 </a:t>
+              <a:t>수정 </a:t>
+            </a:r>
+          </a:p>
+        </p:txBody>
+      </p:sp>
+      <p:sp>
+        <p:nvSpPr>
+          <p:cNvPr id="10" name="TextBox 9">
+            <a:extLst>
+              <a:ext uri="{FF2B5EF4-FFF2-40B4-BE49-F238E27FC236}">
+                <a16:creationId xmlns:a16="http://schemas.microsoft.com/office/drawing/2014/main" id="{05926AB8-8595-4108-BF4D-F89032026589}"/>
+              </a:ext>
+            </a:extLst>
+          </p:cNvPr>
+          <p:cNvSpPr txBox="1"/>
+          <p:nvPr/>
+        </p:nvSpPr>
+        <p:spPr>
+          <a:xfrm>
+            <a:off x="0" y="725556"/>
+            <a:ext cx="12191999" cy="527217"/>
+          </a:xfrm>
+          <a:prstGeom prst="rect">
+            <a:avLst/>
+          </a:prstGeom>
+        </p:spPr>
+        <p:style>
+          <a:lnRef idx="3">
+            <a:schemeClr val="lt1"/>
+          </a:lnRef>
+          <a:fillRef idx="1">
+            <a:schemeClr val="accent4"/>
+          </a:fillRef>
+          <a:effectRef idx="1">
+            <a:schemeClr val="accent4"/>
+          </a:effectRef>
+          <a:fontRef idx="minor">
+            <a:schemeClr val="lt1"/>
+          </a:fontRef>
+        </p:style>
+        <p:txBody>
+          <a:bodyPr wrap="square" rtlCol="0">
+            <a:noAutofit/>
+          </a:bodyPr>
+          <a:lstStyle/>
+          <a:p>
+            <a:pPr marL="0" marR="0" lvl="0" indent="0" algn="ctr" defTabSz="914400" rtl="0" eaLnBrk="1" fontAlgn="auto" latinLnBrk="1" hangingPunct="1">
+              <a:lnSpc>
+                <a:spcPct val="100000"/>
+              </a:lnSpc>
+              <a:spcBef>
+                <a:spcPts val="0"/>
+              </a:spcBef>
+              <a:spcAft>
+                <a:spcPts val="0"/>
+              </a:spcAft>
+              <a:buClrTx/>
+              <a:buSzTx/>
+              <a:buFontTx/>
+              <a:buNone/>
+              <a:tabLst/>
+              <a:defRPr/>
+            </a:pPr>
+            <a:r>
+              <a:rPr kumimoji="0" lang="en-US" altLang="ko-KR" sz="2800" b="1" i="0" u="none" strike="noStrike" kern="1200" cap="none" spc="0" normalizeH="0" baseline="0" noProof="0" dirty="0">
+                <a:ln>
+                  <a:noFill/>
+                </a:ln>
+                <a:solidFill>
+                  <a:prstClr val="white"/>
+                </a:solidFill>
+                <a:effectLst/>
+                <a:uLnTx/>
+                <a:uFillTx/>
+                <a:latin typeface="맑은 고딕" panose="020F0502020204030204"/>
+                <a:ea typeface="맑은 고딕" panose="020B0503020000020004" pitchFamily="50" charset="-127"/>
+                <a:cs typeface="+mn-cs"/>
+              </a:rPr>
+              <a:t>SOLAFY </a:t>
+            </a:r>
+            <a:r>
+              <a:rPr kumimoji="0" lang="en-US" altLang="ko-KR" sz="1400" b="0" i="0" u="none" strike="noStrike" kern="1200" cap="none" spc="0" normalizeH="0" baseline="0" noProof="0" dirty="0">
+                <a:ln>
+                  <a:noFill/>
+                </a:ln>
+                <a:solidFill>
+                  <a:prstClr val="white"/>
+                </a:solidFill>
+                <a:effectLst/>
+                <a:uLnTx/>
+                <a:uFillTx/>
+                <a:latin typeface="맑은 고딕" panose="020F0502020204030204"/>
+                <a:ea typeface="맑은 고딕" panose="020B0503020000020004" pitchFamily="50" charset="-127"/>
+                <a:cs typeface="+mn-cs"/>
+              </a:rPr>
+              <a:t>(</a:t>
+            </a:r>
+            <a:r>
+              <a:rPr kumimoji="0" lang="ko-KR" altLang="en-US" sz="1400" b="0" i="0" u="none" strike="noStrike" kern="1200" cap="none" spc="0" normalizeH="0" baseline="0" noProof="0" dirty="0">
+                <a:ln>
+                  <a:noFill/>
+                </a:ln>
+                <a:solidFill>
+                  <a:prstClr val="white"/>
+                </a:solidFill>
+                <a:effectLst/>
+                <a:uLnTx/>
+                <a:uFillTx/>
+                <a:latin typeface="맑은 고딕" panose="020F0502020204030204"/>
+                <a:ea typeface="맑은 고딕" panose="020B0503020000020004" pitchFamily="50" charset="-127"/>
+                <a:cs typeface="+mn-cs"/>
+              </a:rPr>
+              <a:t>그룹</a:t>
+            </a:r>
+            <a:r>
+              <a:rPr kumimoji="0" lang="en-US" altLang="ko-KR" sz="1400" b="0" i="0" u="none" strike="noStrike" kern="1200" cap="none" spc="0" normalizeH="0" baseline="0" noProof="0" dirty="0">
+                <a:ln>
+                  <a:noFill/>
+                </a:ln>
+                <a:solidFill>
+                  <a:prstClr val="white"/>
+                </a:solidFill>
+                <a:effectLst/>
+                <a:uLnTx/>
+                <a:uFillTx/>
+                <a:latin typeface="맑은 고딕" panose="020F0502020204030204"/>
+                <a:ea typeface="맑은 고딕" panose="020B0503020000020004" pitchFamily="50" charset="-127"/>
+                <a:cs typeface="+mn-cs"/>
+              </a:rPr>
+              <a:t> </a:t>
+            </a:r>
+            <a:r>
+              <a:rPr kumimoji="0" lang="ko-KR" altLang="en-US" sz="1400" b="0" i="0" u="none" strike="noStrike" kern="1200" cap="none" spc="0" normalizeH="0" baseline="0" noProof="0" dirty="0">
+                <a:ln>
+                  <a:noFill/>
+                </a:ln>
+                <a:solidFill>
+                  <a:prstClr val="white"/>
+                </a:solidFill>
+                <a:effectLst/>
+                <a:uLnTx/>
+                <a:uFillTx/>
+                <a:latin typeface="맑은 고딕" panose="020F0502020204030204"/>
+                <a:ea typeface="맑은 고딕" panose="020B0503020000020004" pitchFamily="50" charset="-127"/>
+                <a:cs typeface="+mn-cs"/>
+              </a:rPr>
+              <a:t>명</a:t>
+            </a:r>
+            <a:r>
+              <a:rPr kumimoji="0" lang="en-US" altLang="ko-KR" sz="1400" b="0" i="0" u="none" strike="noStrike" kern="1200" cap="none" spc="0" normalizeH="0" baseline="0" noProof="0" dirty="0">
+                <a:ln>
+                  <a:noFill/>
+                </a:ln>
+                <a:solidFill>
+                  <a:prstClr val="white"/>
+                </a:solidFill>
+                <a:effectLst/>
+                <a:uLnTx/>
+                <a:uFillTx/>
+                <a:latin typeface="맑은 고딕" panose="020F0502020204030204"/>
+                <a:ea typeface="맑은 고딕" panose="020B0503020000020004" pitchFamily="50" charset="-127"/>
+                <a:cs typeface="+mn-cs"/>
+              </a:rPr>
+              <a:t>)</a:t>
+            </a:r>
+            <a:endParaRPr kumimoji="0" lang="ko-KR" altLang="en-US" sz="1400" b="0" i="0" u="none" strike="noStrike" kern="1200" cap="none" spc="0" normalizeH="0" baseline="0" noProof="0" dirty="0">
+              <a:ln>
+                <a:noFill/>
+              </a:ln>
+              <a:solidFill>
+                <a:prstClr val="white"/>
+              </a:solidFill>
+              <a:effectLst/>
+              <a:uLnTx/>
+              <a:uFillTx/>
+              <a:latin typeface="맑은 고딕" panose="020F0502020204030204"/>
+              <a:ea typeface="맑은 고딕" panose="020B0503020000020004" pitchFamily="50" charset="-127"/>
+              <a:cs typeface="+mn-cs"/>
+            </a:endParaRPr>
+          </a:p>
+          <a:p>
+            <a:pPr algn="ctr"/>
+            <a:endParaRPr lang="ko-KR" altLang="en-US" dirty="0"/>
+          </a:p>
+        </p:txBody>
+      </p:sp>
+      <p:sp>
+        <p:nvSpPr>
+          <p:cNvPr id="12" name="직사각형 11">
+            <a:extLst>
+              <a:ext uri="{FF2B5EF4-FFF2-40B4-BE49-F238E27FC236}">
+                <a16:creationId xmlns:a16="http://schemas.microsoft.com/office/drawing/2014/main" id="{3945E1DE-755A-417C-A71D-8F0FB7891A78}"/>
+              </a:ext>
+            </a:extLst>
+          </p:cNvPr>
+          <p:cNvSpPr/>
+          <p:nvPr/>
+        </p:nvSpPr>
+        <p:spPr>
+          <a:xfrm>
+            <a:off x="5967016" y="6472893"/>
+            <a:ext cx="680168" cy="300446"/>
+          </a:xfrm>
+          <a:prstGeom prst="rect">
+            <a:avLst/>
+          </a:prstGeom>
+          <a:solidFill>
+            <a:schemeClr val="accent2"/>
+          </a:solidFill>
+          <a:ln>
+            <a:noFill/>
+          </a:ln>
+        </p:spPr>
+        <p:style>
+          <a:lnRef idx="0">
+            <a:scrgbClr r="0" g="0" b="0"/>
+          </a:lnRef>
+          <a:fillRef idx="0">
+            <a:scrgbClr r="0" g="0" b="0"/>
+          </a:fillRef>
+          <a:effectRef idx="0">
+            <a:scrgbClr r="0" g="0" b="0"/>
+          </a:effectRef>
+          <a:fontRef idx="minor">
+            <a:schemeClr val="lt1"/>
+          </a:fontRef>
+        </p:style>
+        <p:txBody>
+          <a:bodyPr rtlCol="0" anchor="ctr"/>
+          <a:lstStyle/>
+          <a:p>
+            <a:pPr algn="ctr"/>
+            <a:r>
+              <a:rPr lang="ko-KR" altLang="en-US" sz="1200" b="1" dirty="0"/>
+              <a:t>취소</a:t>
             </a:r>
           </a:p>
         </p:txBody>
       </p:sp>
       <p:graphicFrame>
         <p:nvGraphicFramePr>
-          <p:cNvPr id="11" name="표 2">
-            <a:extLst>
-              <a:ext uri="{FF2B5EF4-FFF2-40B4-BE49-F238E27FC236}">
-                <a16:creationId xmlns:a16="http://schemas.microsoft.com/office/drawing/2014/main" id="{86F05277-67A9-4AC2-AE3B-41E89E8A8FD9}"/>
+          <p:cNvPr id="2" name="표 2">
+            <a:extLst>
+              <a:ext uri="{FF2B5EF4-FFF2-40B4-BE49-F238E27FC236}">
+                <a16:creationId xmlns:a16="http://schemas.microsoft.com/office/drawing/2014/main" id="{113707C9-7A50-4C37-95CB-244D8428F348}"/>
               </a:ext>
             </a:extLst>
           </p:cNvPr>
@@ -3661,14 +5211,128 @@
           <p:nvPr>
             <p:extLst>
               <p:ext uri="{D42A27DB-BD31-4B8C-83A1-F6EECF244321}">
-                <p14:modId xmlns:p14="http://schemas.microsoft.com/office/powerpoint/2010/main" val="1206137075"/>
+                <p14:modId xmlns:p14="http://schemas.microsoft.com/office/powerpoint/2010/main" val="3865422884"/>
               </p:ext>
             </p:extLst>
           </p:nvPr>
         </p:nvGraphicFramePr>
         <p:xfrm>
-          <a:off x="1519835" y="2119721"/>
-          <a:ext cx="9152330" cy="1699804"/>
+          <a:off x="1402269" y="3446575"/>
+          <a:ext cx="7113900" cy="318284"/>
+        </p:xfrm>
+        <a:graphic>
+          <a:graphicData uri="http://schemas.openxmlformats.org/drawingml/2006/table">
+            <a:tbl>
+              <a:tblPr firstRow="1" bandRow="1">
+                <a:tableStyleId>{775DCB02-9BB8-47FD-8907-85C794F793BA}</a:tableStyleId>
+              </a:tblPr>
+              <a:tblGrid>
+                <a:gridCol w="2371300">
+                  <a:extLst>
+                    <a:ext uri="{9D8B030D-6E8A-4147-A177-3AD203B41FA5}">
+                      <a16:colId xmlns:a16="http://schemas.microsoft.com/office/drawing/2014/main" val="1250263218"/>
+                    </a:ext>
+                  </a:extLst>
+                </a:gridCol>
+                <a:gridCol w="2371300">
+                  <a:extLst>
+                    <a:ext uri="{9D8B030D-6E8A-4147-A177-3AD203B41FA5}">
+                      <a16:colId xmlns:a16="http://schemas.microsoft.com/office/drawing/2014/main" val="2902916699"/>
+                    </a:ext>
+                  </a:extLst>
+                </a:gridCol>
+                <a:gridCol w="2371300">
+                  <a:extLst>
+                    <a:ext uri="{9D8B030D-6E8A-4147-A177-3AD203B41FA5}">
+                      <a16:colId xmlns:a16="http://schemas.microsoft.com/office/drawing/2014/main" val="2064578966"/>
+                    </a:ext>
+                  </a:extLst>
+                </a:gridCol>
+              </a:tblGrid>
+              <a:tr h="318284">
+                <a:tc>
+                  <a:txBody>
+                    <a:bodyPr/>
+                    <a:lstStyle/>
+                    <a:p>
+                      <a:pPr algn="ctr" latinLnBrk="1"/>
+                      <a:r>
+                        <a:rPr lang="ko-KR" altLang="en-US" sz="1400" b="1" dirty="0"/>
+                        <a:t>그룹 수정</a:t>
+                      </a:r>
+                    </a:p>
+                  </a:txBody>
+                  <a:tcPr>
+                    <a:noFill/>
+                  </a:tcPr>
+                </a:tc>
+                <a:tc>
+                  <a:txBody>
+                    <a:bodyPr/>
+                    <a:lstStyle/>
+                    <a:p>
+                      <a:pPr algn="ctr" latinLnBrk="1"/>
+                      <a:r>
+                        <a:rPr lang="ko-KR" altLang="en-US" sz="1400" b="1" dirty="0"/>
+                        <a:t>게시판</a:t>
+                      </a:r>
+                    </a:p>
+                  </a:txBody>
+                  <a:tcPr>
+                    <a:solidFill>
+                      <a:srgbClr val="FFC000"/>
+                    </a:solidFill>
+                  </a:tcPr>
+                </a:tc>
+                <a:tc>
+                  <a:txBody>
+                    <a:bodyPr/>
+                    <a:lstStyle/>
+                    <a:p>
+                      <a:pPr algn="ctr" latinLnBrk="1"/>
+                      <a:r>
+                        <a:rPr lang="ko-KR" altLang="en-US" sz="1400" b="1" dirty="0"/>
+                        <a:t>그룹원관리</a:t>
+                      </a:r>
+                    </a:p>
+                  </a:txBody>
+                  <a:tcPr>
+                    <a:noFill/>
+                  </a:tcPr>
+                </a:tc>
+                <a:extLst>
+                  <a:ext uri="{0D108BD9-81ED-4DB2-BD59-A6C34878D82A}">
+                    <a16:rowId xmlns:a16="http://schemas.microsoft.com/office/drawing/2014/main" val="1655162773"/>
+                  </a:ext>
+                </a:extLst>
+              </a:tr>
+            </a:tbl>
+          </a:graphicData>
+        </a:graphic>
+      </p:graphicFrame>
+      <p:graphicFrame>
+        <p:nvGraphicFramePr>
+          <p:cNvPr id="30" name="표 2">
+            <a:extLst>
+              <a:ext uri="{FF2B5EF4-FFF2-40B4-BE49-F238E27FC236}">
+                <a16:creationId xmlns:a16="http://schemas.microsoft.com/office/drawing/2014/main" id="{5FF28B29-F971-4240-AA63-DFDB88AB2B9B}"/>
+              </a:ext>
+            </a:extLst>
+          </p:cNvPr>
+          <p:cNvGraphicFramePr>
+            <a:graphicFrameLocks noGrp="1"/>
+          </p:cNvGraphicFramePr>
+          <p:nvPr>
+            <p:extLst>
+              <p:ext uri="{D42A27DB-BD31-4B8C-83A1-F6EECF244321}">
+                <p14:modId xmlns:p14="http://schemas.microsoft.com/office/powerpoint/2010/main" val="2851618799"/>
+              </p:ext>
+            </p:extLst>
+          </p:nvPr>
+        </p:nvGraphicFramePr>
+        <p:xfrm>
+          <a:off x="1624527" y="3967573"/>
+          <a:ext cx="9152330" cy="2002116"/>
         </p:xfrm>
         <a:graphic>
           <a:graphicData uri="http://schemas.openxmlformats.org/drawingml/2006/table">
@@ -3692,7 +5356,7 @@
                   </a:extLst>
                 </a:gridCol>
               </a:tblGrid>
-              <a:tr h="805354">
+              <a:tr h="667372">
                 <a:tc>
                   <a:txBody>
                     <a:bodyPr/>
@@ -3700,12 +5364,8 @@
                     <a:p>
                       <a:pPr algn="ctr" latinLnBrk="1"/>
                       <a:r>
-                        <a:rPr lang="ko-KR" altLang="en-US" sz="1100" dirty="0" err="1"/>
-                        <a:t>그룹명</a:t>
-                      </a:r>
-                      <a:r>
                         <a:rPr lang="ko-KR" altLang="en-US" sz="1100" dirty="0"/>
-                        <a:t> </a:t>
+                        <a:t>게시판 명 </a:t>
                       </a:r>
                     </a:p>
                   </a:txBody>
@@ -3718,10 +5378,9 @@
                     <a:p>
                       <a:pPr algn="ctr" latinLnBrk="1"/>
                       <a:r>
-                        <a:rPr lang="en-US" altLang="ko-KR" sz="1100" dirty="0"/>
-                        <a:t>SOLAFY</a:t>
-                      </a:r>
-                      <a:endParaRPr lang="ko-KR" altLang="en-US" sz="1100" dirty="0"/>
+                        <a:rPr lang="ko-KR" altLang="en-US" sz="1100" dirty="0"/>
+                        <a:t>자유게시판</a:t>
+                      </a:r>
                     </a:p>
                   </a:txBody>
                   <a:tcPr anchor="ctr"/>
@@ -3732,7 +5391,7 @@
                   </a:ext>
                 </a:extLst>
               </a:tr>
-              <a:tr h="447225">
+              <a:tr h="667372">
                 <a:tc>
                   <a:txBody>
                     <a:bodyPr/>
@@ -3741,51 +5400,26 @@
                       <a:pPr algn="ctr" latinLnBrk="1"/>
                       <a:r>
                         <a:rPr lang="ko-KR" altLang="en-US" sz="1100" b="1" dirty="0"/>
-                        <a:t>그룹</a:t>
-                      </a:r>
-                      <a:r>
-                        <a:rPr lang="en-US" altLang="ko-KR" sz="1100" b="1" dirty="0"/>
+                        <a:t>공개 설정</a:t>
+                      </a:r>
+                    </a:p>
+                  </a:txBody>
+                  <a:tcPr anchor="ctr"/>
+                </a:tc>
+                <a:tc>
+                  <a:txBody>
+                    <a:bodyPr/>
+                    <a:lstStyle/>
+                    <a:p>
+                      <a:pPr algn="ctr" latinLnBrk="1"/>
+                      <a:r>
+                        <a:rPr lang="en-US" altLang="ko-KR" sz="1100" dirty="0"/>
+                        <a:t>Public      Private</a:t>
+                      </a:r>
+                      <a:r>
+                        <a:rPr lang="ko-KR" altLang="en-US" sz="1100" dirty="0"/>
                         <a:t> </a:t>
                       </a:r>
-                      <a:r>
-                        <a:rPr lang="ko-KR" altLang="en-US" sz="1100" b="1" dirty="0"/>
-                        <a:t>설명</a:t>
-                      </a:r>
-                    </a:p>
-                  </a:txBody>
-                  <a:tcPr anchor="ctr"/>
-                </a:tc>
-                <a:tc>
-                  <a:txBody>
-                    <a:bodyPr/>
-                    <a:lstStyle/>
-                    <a:p>
-                      <a:pPr algn="ctr" latinLnBrk="1"/>
-                      <a:r>
-                        <a:rPr lang="ko-KR" altLang="en-US" sz="1100" dirty="0"/>
-                        <a:t>안녕하세요 </a:t>
-                      </a:r>
-                      <a:r>
-                        <a:rPr lang="en-US" altLang="ko-KR" sz="1100" dirty="0"/>
-                        <a:t>SOLAFY</a:t>
-                      </a:r>
-                      <a:r>
-                        <a:rPr lang="ko-KR" altLang="en-US" sz="1100" dirty="0"/>
-                        <a:t>의 </a:t>
-                      </a:r>
-                      <a:r>
-                        <a:rPr lang="en-US" altLang="ko-KR" sz="1100" dirty="0"/>
-                        <a:t>SOLAFY </a:t>
-                      </a:r>
-                      <a:r>
-                        <a:rPr lang="ko-KR" altLang="en-US" sz="1100" dirty="0"/>
-                        <a:t>그룹입니다</a:t>
-                      </a:r>
-                      <a:r>
-                        <a:rPr lang="en-US" altLang="ko-KR" sz="1100" dirty="0"/>
-                        <a:t>.</a:t>
-                      </a:r>
-                      <a:endParaRPr lang="ko-KR" altLang="en-US" sz="1100" dirty="0"/>
                     </a:p>
                   </a:txBody>
                   <a:tcPr anchor="ctr"/>
@@ -3796,7 +5430,7 @@
                   </a:ext>
                 </a:extLst>
               </a:tr>
-              <a:tr h="447225">
+              <a:tr h="667372">
                 <a:tc>
                   <a:txBody>
                     <a:bodyPr/>
@@ -3805,7 +5439,7 @@
                       <a:pPr algn="ctr" latinLnBrk="1"/>
                       <a:r>
                         <a:rPr lang="ko-KR" altLang="en-US" sz="1100" b="1" dirty="0"/>
-                        <a:t>공개 설정</a:t>
+                        <a:t>게시판 삭제</a:t>
                       </a:r>
                     </a:p>
                   </a:txBody>
@@ -3817,21 +5451,14 @@
                     <a:lstStyle/>
                     <a:p>
                       <a:pPr algn="ctr" latinLnBrk="1"/>
-                      <a:r>
-                        <a:rPr lang="en-US" altLang="ko-KR" sz="1100" dirty="0"/>
-                        <a:t>Public      Private</a:t>
-                      </a:r>
-                      <a:r>
-                        <a:rPr lang="ko-KR" altLang="en-US" sz="1100" dirty="0"/>
-                        <a:t> </a:t>
-                      </a:r>
+                      <a:endParaRPr lang="ko-KR" altLang="en-US" sz="1100" dirty="0"/>
                     </a:p>
                   </a:txBody>
                   <a:tcPr anchor="ctr"/>
                 </a:tc>
                 <a:extLst>
                   <a:ext uri="{0D108BD9-81ED-4DB2-BD59-A6C34878D82A}">
-                    <a16:rowId xmlns:a16="http://schemas.microsoft.com/office/drawing/2014/main" val="1360283255"/>
+                    <a16:rowId xmlns:a16="http://schemas.microsoft.com/office/drawing/2014/main" val="723112192"/>
                   </a:ext>
                 </a:extLst>
               </a:tr>
@@ -3841,10 +5468,10 @@
       </p:graphicFrame>
       <p:sp>
         <p:nvSpPr>
-          <p:cNvPr id="12" name="직사각형 11">
-            <a:extLst>
-              <a:ext uri="{FF2B5EF4-FFF2-40B4-BE49-F238E27FC236}">
-                <a16:creationId xmlns:a16="http://schemas.microsoft.com/office/drawing/2014/main" id="{3945E1DE-755A-417C-A71D-8F0FB7891A78}"/>
+          <p:cNvPr id="32" name="타원 31">
+            <a:extLst>
+              <a:ext uri="{FF2B5EF4-FFF2-40B4-BE49-F238E27FC236}">
+                <a16:creationId xmlns:a16="http://schemas.microsoft.com/office/drawing/2014/main" id="{4DD2665D-B531-4CB9-BB29-095B1FC434ED}"/>
               </a:ext>
             </a:extLst>
           </p:cNvPr>
@@ -3853,7 +5480,313 @@
         </p:nvSpPr>
         <p:spPr>
           <a:xfrm>
-            <a:off x="5879741" y="4471112"/>
+            <a:off x="7152280" y="4899335"/>
+            <a:ext cx="152400" cy="160866"/>
+          </a:xfrm>
+          <a:prstGeom prst="ellipse">
+            <a:avLst/>
+          </a:prstGeom>
+        </p:spPr>
+        <p:style>
+          <a:lnRef idx="2">
+            <a:schemeClr val="accent4"/>
+          </a:lnRef>
+          <a:fillRef idx="1">
+            <a:schemeClr val="lt1"/>
+          </a:fillRef>
+          <a:effectRef idx="0">
+            <a:schemeClr val="accent4"/>
+          </a:effectRef>
+          <a:fontRef idx="minor">
+            <a:schemeClr val="dk1"/>
+          </a:fontRef>
+        </p:style>
+        <p:txBody>
+          <a:bodyPr rtlCol="0" anchor="ctr"/>
+          <a:lstStyle/>
+          <a:p>
+            <a:pPr algn="ctr"/>
+            <a:endParaRPr lang="ko-KR" altLang="en-US"/>
+          </a:p>
+        </p:txBody>
+      </p:sp>
+      <p:sp>
+        <p:nvSpPr>
+          <p:cNvPr id="33" name="타원 32">
+            <a:extLst>
+              <a:ext uri="{FF2B5EF4-FFF2-40B4-BE49-F238E27FC236}">
+                <a16:creationId xmlns:a16="http://schemas.microsoft.com/office/drawing/2014/main" id="{449C7292-40A3-4607-BE25-FF5F2EBD1899}"/>
+              </a:ext>
+            </a:extLst>
+          </p:cNvPr>
+          <p:cNvSpPr/>
+          <p:nvPr/>
+        </p:nvSpPr>
+        <p:spPr>
+          <a:xfrm>
+            <a:off x="7185617" y="4934524"/>
+            <a:ext cx="85725" cy="90487"/>
+          </a:xfrm>
+          <a:prstGeom prst="ellipse">
+            <a:avLst/>
+          </a:prstGeom>
+        </p:spPr>
+        <p:style>
+          <a:lnRef idx="1">
+            <a:schemeClr val="accent5"/>
+          </a:lnRef>
+          <a:fillRef idx="3">
+            <a:schemeClr val="accent5"/>
+          </a:fillRef>
+          <a:effectRef idx="2">
+            <a:schemeClr val="accent5"/>
+          </a:effectRef>
+          <a:fontRef idx="minor">
+            <a:schemeClr val="lt1"/>
+          </a:fontRef>
+        </p:style>
+        <p:txBody>
+          <a:bodyPr rtlCol="0" anchor="ctr"/>
+          <a:lstStyle/>
+          <a:p>
+            <a:pPr algn="ctr"/>
+            <a:endParaRPr lang="ko-KR" altLang="en-US"/>
+          </a:p>
+        </p:txBody>
+      </p:sp>
+      <p:sp>
+        <p:nvSpPr>
+          <p:cNvPr id="34" name="타원 33">
+            <a:extLst>
+              <a:ext uri="{FF2B5EF4-FFF2-40B4-BE49-F238E27FC236}">
+                <a16:creationId xmlns:a16="http://schemas.microsoft.com/office/drawing/2014/main" id="{83069A71-AF1E-4F38-B66A-1EF7D699F05E}"/>
+              </a:ext>
+            </a:extLst>
+          </p:cNvPr>
+          <p:cNvSpPr/>
+          <p:nvPr/>
+        </p:nvSpPr>
+        <p:spPr>
+          <a:xfrm>
+            <a:off x="7933330" y="4899335"/>
+            <a:ext cx="152400" cy="160866"/>
+          </a:xfrm>
+          <a:prstGeom prst="ellipse">
+            <a:avLst/>
+          </a:prstGeom>
+        </p:spPr>
+        <p:style>
+          <a:lnRef idx="2">
+            <a:schemeClr val="accent4"/>
+          </a:lnRef>
+          <a:fillRef idx="1">
+            <a:schemeClr val="lt1"/>
+          </a:fillRef>
+          <a:effectRef idx="0">
+            <a:schemeClr val="accent4"/>
+          </a:effectRef>
+          <a:fontRef idx="minor">
+            <a:schemeClr val="dk1"/>
+          </a:fontRef>
+        </p:style>
+        <p:txBody>
+          <a:bodyPr rtlCol="0" anchor="ctr"/>
+          <a:lstStyle/>
+          <a:p>
+            <a:pPr algn="ctr"/>
+            <a:endParaRPr lang="ko-KR" altLang="en-US"/>
+          </a:p>
+        </p:txBody>
+      </p:sp>
+      <p:sp>
+        <p:nvSpPr>
+          <p:cNvPr id="35" name="직사각형 34">
+            <a:extLst>
+              <a:ext uri="{FF2B5EF4-FFF2-40B4-BE49-F238E27FC236}">
+                <a16:creationId xmlns:a16="http://schemas.microsoft.com/office/drawing/2014/main" id="{9FF39AF1-4810-4027-A1C3-AC7B957B4283}"/>
+              </a:ext>
+            </a:extLst>
+          </p:cNvPr>
+          <p:cNvSpPr/>
+          <p:nvPr/>
+        </p:nvSpPr>
+        <p:spPr>
+          <a:xfrm>
+            <a:off x="4924665" y="3768386"/>
+            <a:ext cx="1215887" cy="601519"/>
+          </a:xfrm>
+          <a:prstGeom prst="rect">
+            <a:avLst/>
+          </a:prstGeom>
+          <a:solidFill>
+            <a:schemeClr val="bg1">
+              <a:lumMod val="95000"/>
+            </a:schemeClr>
+          </a:solidFill>
+          <a:effectLst>
+            <a:outerShdw blurRad="50800" dist="38100" dir="2700000" algn="tl" rotWithShape="0">
+              <a:prstClr val="black">
+                <a:alpha val="40000"/>
+              </a:prstClr>
+            </a:outerShdw>
+          </a:effectLst>
+        </p:spPr>
+        <p:style>
+          <a:lnRef idx="2">
+            <a:schemeClr val="accent3">
+              <a:shade val="50000"/>
+            </a:schemeClr>
+          </a:lnRef>
+          <a:fillRef idx="1">
+            <a:schemeClr val="accent3"/>
+          </a:fillRef>
+          <a:effectRef idx="0">
+            <a:schemeClr val="accent3"/>
+          </a:effectRef>
+          <a:fontRef idx="minor">
+            <a:schemeClr val="lt1"/>
+          </a:fontRef>
+        </p:style>
+        <p:txBody>
+          <a:bodyPr rtlCol="0" anchor="t"/>
+          <a:lstStyle/>
+          <a:p>
+            <a:pPr marL="342900" indent="-342900">
+              <a:buAutoNum type="arabicPeriod"/>
+            </a:pPr>
+            <a:r>
+              <a:rPr lang="ko-KR" altLang="en-US" sz="1050" b="1" dirty="0">
+                <a:solidFill>
+                  <a:schemeClr val="tx1"/>
+                </a:solidFill>
+              </a:rPr>
+              <a:t>자유게시판</a:t>
+            </a:r>
+            <a:endParaRPr lang="en-US" altLang="ko-KR" sz="1050" b="1" dirty="0">
+              <a:solidFill>
+                <a:schemeClr val="tx1"/>
+              </a:solidFill>
+            </a:endParaRPr>
+          </a:p>
+          <a:p>
+            <a:pPr marL="342900" indent="-342900">
+              <a:buAutoNum type="arabicPeriod"/>
+            </a:pPr>
+            <a:r>
+              <a:rPr lang="ko-KR" altLang="en-US" sz="1050" dirty="0">
+                <a:solidFill>
+                  <a:schemeClr val="tx1"/>
+                </a:solidFill>
+              </a:rPr>
+              <a:t>질문게시판</a:t>
+            </a:r>
+            <a:endParaRPr lang="en-US" altLang="ko-KR" sz="1050" dirty="0">
+              <a:solidFill>
+                <a:schemeClr val="tx1"/>
+              </a:solidFill>
+            </a:endParaRPr>
+          </a:p>
+          <a:p>
+            <a:pPr marL="342900" indent="-342900">
+              <a:buAutoNum type="arabicPeriod"/>
+            </a:pPr>
+            <a:r>
+              <a:rPr lang="en-US" altLang="ko-KR" sz="1050" dirty="0">
+                <a:solidFill>
+                  <a:schemeClr val="tx1"/>
+                </a:solidFill>
+              </a:rPr>
+              <a:t>…</a:t>
+            </a:r>
+          </a:p>
+          <a:p>
+            <a:pPr marL="342900" indent="-342900">
+              <a:buAutoNum type="arabicPeriod"/>
+            </a:pPr>
+            <a:endParaRPr lang="ko-KR" altLang="en-US" sz="1050" dirty="0">
+              <a:solidFill>
+                <a:schemeClr val="tx1"/>
+              </a:solidFill>
+            </a:endParaRPr>
+          </a:p>
+        </p:txBody>
+      </p:sp>
+      <p:sp>
+        <p:nvSpPr>
+          <p:cNvPr id="36" name="TextBox 35">
+            <a:extLst>
+              <a:ext uri="{FF2B5EF4-FFF2-40B4-BE49-F238E27FC236}">
+                <a16:creationId xmlns:a16="http://schemas.microsoft.com/office/drawing/2014/main" id="{E400A6C3-26F5-49BB-AD92-33794D2C87CD}"/>
+              </a:ext>
+            </a:extLst>
+          </p:cNvPr>
+          <p:cNvSpPr txBox="1"/>
+          <p:nvPr/>
+        </p:nvSpPr>
+        <p:spPr>
+          <a:xfrm>
+            <a:off x="6647184" y="5521416"/>
+            <a:ext cx="1461052" cy="276999"/>
+          </a:xfrm>
+          <a:prstGeom prst="rect">
+            <a:avLst/>
+          </a:prstGeom>
+        </p:spPr>
+        <p:style>
+          <a:lnRef idx="2">
+            <a:schemeClr val="accent1"/>
+          </a:lnRef>
+          <a:fillRef idx="1">
+            <a:schemeClr val="lt1"/>
+          </a:fillRef>
+          <a:effectRef idx="0">
+            <a:schemeClr val="accent1"/>
+          </a:effectRef>
+          <a:fontRef idx="minor">
+            <a:schemeClr val="dk1"/>
+          </a:fontRef>
+        </p:style>
+        <p:txBody>
+          <a:bodyPr wrap="square" rtlCol="0">
+            <a:spAutoFit/>
+          </a:bodyPr>
+          <a:lstStyle/>
+          <a:p>
+            <a:r>
+              <a:rPr lang="ko-KR" altLang="en-US" sz="1200" b="1" dirty="0">
+                <a:solidFill>
+                  <a:schemeClr val="bg1">
+                    <a:lumMod val="65000"/>
+                  </a:schemeClr>
+                </a:solidFill>
+              </a:rPr>
+              <a:t>게시판 명</a:t>
+            </a:r>
+            <a:endParaRPr lang="en-US" altLang="ko-KR" sz="1200" b="1" dirty="0">
+              <a:solidFill>
+                <a:schemeClr val="bg1">
+                  <a:lumMod val="65000"/>
+                </a:schemeClr>
+              </a:solidFill>
+            </a:endParaRPr>
+          </a:p>
+        </p:txBody>
+      </p:sp>
+      <p:sp>
+        <p:nvSpPr>
+          <p:cNvPr id="37" name="직사각형 36">
+            <a:extLst>
+              <a:ext uri="{FF2B5EF4-FFF2-40B4-BE49-F238E27FC236}">
+                <a16:creationId xmlns:a16="http://schemas.microsoft.com/office/drawing/2014/main" id="{6A4D4D6E-D88A-405F-9743-96C36ABB479B}"/>
+              </a:ext>
+            </a:extLst>
+          </p:cNvPr>
+          <p:cNvSpPr/>
+          <p:nvPr/>
+        </p:nvSpPr>
+        <p:spPr>
+          <a:xfrm>
+            <a:off x="8468294" y="5521416"/>
             <a:ext cx="680168" cy="300446"/>
           </a:xfrm>
           <a:prstGeom prst="rect">
@@ -3887,200 +5820,15 @@
             <a:pPr algn="ctr"/>
             <a:r>
               <a:rPr lang="ko-KR" altLang="en-US" sz="1200" b="1" dirty="0"/>
-              <a:t>취소</a:t>
-            </a:r>
-          </a:p>
-        </p:txBody>
-      </p:sp>
-      <p:sp>
-        <p:nvSpPr>
-          <p:cNvPr id="13" name="직사각형 12">
-            <a:extLst>
-              <a:ext uri="{FF2B5EF4-FFF2-40B4-BE49-F238E27FC236}">
-                <a16:creationId xmlns:a16="http://schemas.microsoft.com/office/drawing/2014/main" id="{6DC2C3C6-5E9A-4880-8ECE-57833B5C22D8}"/>
-              </a:ext>
-            </a:extLst>
-          </p:cNvPr>
-          <p:cNvSpPr/>
-          <p:nvPr/>
-        </p:nvSpPr>
-        <p:spPr>
-          <a:xfrm>
-            <a:off x="8740139" y="2387330"/>
-            <a:ext cx="918293" cy="300446"/>
-          </a:xfrm>
-          <a:prstGeom prst="rect">
-            <a:avLst/>
-          </a:prstGeom>
-          <a:solidFill>
-            <a:schemeClr val="accent6"/>
-          </a:solidFill>
-          <a:ln>
-            <a:noFill/>
-          </a:ln>
-        </p:spPr>
-        <p:style>
-          <a:lnRef idx="0">
-            <a:scrgbClr r="0" g="0" b="0"/>
-          </a:lnRef>
-          <a:fillRef idx="0">
-            <a:scrgbClr r="0" g="0" b="0"/>
-          </a:fillRef>
-          <a:effectRef idx="0">
-            <a:scrgbClr r="0" g="0" b="0"/>
-          </a:effectRef>
-          <a:fontRef idx="minor">
-            <a:schemeClr val="lt1"/>
-          </a:fontRef>
-        </p:style>
-        <p:txBody>
-          <a:bodyPr rtlCol="0" anchor="ctr"/>
-          <a:lstStyle/>
-          <a:p>
-            <a:pPr algn="ctr"/>
-            <a:r>
-              <a:rPr lang="ko-KR" altLang="en-US" sz="1200" b="1" dirty="0"/>
-              <a:t>중복 확인</a:t>
-            </a:r>
-          </a:p>
-        </p:txBody>
-      </p:sp>
-      <p:sp>
-        <p:nvSpPr>
-          <p:cNvPr id="22" name="타원 21">
-            <a:extLst>
-              <a:ext uri="{FF2B5EF4-FFF2-40B4-BE49-F238E27FC236}">
-                <a16:creationId xmlns:a16="http://schemas.microsoft.com/office/drawing/2014/main" id="{6DB2A7EE-A765-4097-ADF3-3AFAE58A76AC}"/>
-              </a:ext>
-            </a:extLst>
-          </p:cNvPr>
-          <p:cNvSpPr/>
-          <p:nvPr/>
-        </p:nvSpPr>
-        <p:spPr>
-          <a:xfrm>
-            <a:off x="7073903" y="3512872"/>
-            <a:ext cx="152400" cy="160866"/>
-          </a:xfrm>
-          <a:prstGeom prst="ellipse">
-            <a:avLst/>
-          </a:prstGeom>
-        </p:spPr>
-        <p:style>
-          <a:lnRef idx="2">
-            <a:schemeClr val="accent4"/>
-          </a:lnRef>
-          <a:fillRef idx="1">
-            <a:schemeClr val="lt1"/>
-          </a:fillRef>
-          <a:effectRef idx="0">
-            <a:schemeClr val="accent4"/>
-          </a:effectRef>
-          <a:fontRef idx="minor">
-            <a:schemeClr val="dk1"/>
-          </a:fontRef>
-        </p:style>
-        <p:txBody>
-          <a:bodyPr rtlCol="0" anchor="ctr"/>
-          <a:lstStyle/>
-          <a:p>
-            <a:pPr algn="ctr"/>
-            <a:endParaRPr lang="ko-KR" altLang="en-US"/>
-          </a:p>
-        </p:txBody>
-      </p:sp>
-      <p:sp>
-        <p:nvSpPr>
-          <p:cNvPr id="2" name="타원 1">
-            <a:extLst>
-              <a:ext uri="{FF2B5EF4-FFF2-40B4-BE49-F238E27FC236}">
-                <a16:creationId xmlns:a16="http://schemas.microsoft.com/office/drawing/2014/main" id="{6D753B8C-6000-4CF0-9CAA-1B2D8E71DAF3}"/>
-              </a:ext>
-            </a:extLst>
-          </p:cNvPr>
-          <p:cNvSpPr/>
-          <p:nvPr/>
-        </p:nvSpPr>
-        <p:spPr>
-          <a:xfrm>
-            <a:off x="7107240" y="3548061"/>
-            <a:ext cx="85725" cy="90487"/>
-          </a:xfrm>
-          <a:prstGeom prst="ellipse">
-            <a:avLst/>
-          </a:prstGeom>
-        </p:spPr>
-        <p:style>
-          <a:lnRef idx="1">
-            <a:schemeClr val="accent5"/>
-          </a:lnRef>
-          <a:fillRef idx="3">
-            <a:schemeClr val="accent5"/>
-          </a:fillRef>
-          <a:effectRef idx="2">
-            <a:schemeClr val="accent5"/>
-          </a:effectRef>
-          <a:fontRef idx="minor">
-            <a:schemeClr val="lt1"/>
-          </a:fontRef>
-        </p:style>
-        <p:txBody>
-          <a:bodyPr rtlCol="0" anchor="ctr"/>
-          <a:lstStyle/>
-          <a:p>
-            <a:pPr algn="ctr"/>
-            <a:endParaRPr lang="ko-KR" altLang="en-US"/>
-          </a:p>
-        </p:txBody>
-      </p:sp>
-      <p:sp>
-        <p:nvSpPr>
-          <p:cNvPr id="23" name="타원 22">
-            <a:extLst>
-              <a:ext uri="{FF2B5EF4-FFF2-40B4-BE49-F238E27FC236}">
-                <a16:creationId xmlns:a16="http://schemas.microsoft.com/office/drawing/2014/main" id="{08D7FDFE-F604-416E-BB6F-8170739FD9B5}"/>
-              </a:ext>
-            </a:extLst>
-          </p:cNvPr>
-          <p:cNvSpPr/>
-          <p:nvPr/>
-        </p:nvSpPr>
-        <p:spPr>
-          <a:xfrm>
-            <a:off x="7854953" y="3512872"/>
-            <a:ext cx="152400" cy="160866"/>
-          </a:xfrm>
-          <a:prstGeom prst="ellipse">
-            <a:avLst/>
-          </a:prstGeom>
-        </p:spPr>
-        <p:style>
-          <a:lnRef idx="2">
-            <a:schemeClr val="accent4"/>
-          </a:lnRef>
-          <a:fillRef idx="1">
-            <a:schemeClr val="lt1"/>
-          </a:fillRef>
-          <a:effectRef idx="0">
-            <a:schemeClr val="accent4"/>
-          </a:effectRef>
-          <a:fontRef idx="minor">
-            <a:schemeClr val="dk1"/>
-          </a:fontRef>
-        </p:style>
-        <p:txBody>
-          <a:bodyPr rtlCol="0" anchor="ctr"/>
-          <a:lstStyle/>
-          <a:p>
-            <a:pPr algn="ctr"/>
-            <a:endParaRPr lang="ko-KR" altLang="en-US"/>
+              <a:t>삭제</a:t>
+            </a:r>
           </a:p>
         </p:txBody>
       </p:sp>
     </p:spTree>
     <p:extLst>
       <p:ext uri="{BB962C8B-B14F-4D97-AF65-F5344CB8AC3E}">
-        <p14:creationId xmlns:p14="http://schemas.microsoft.com/office/powerpoint/2010/main" val="4270958819"/>
+        <p14:creationId xmlns:p14="http://schemas.microsoft.com/office/powerpoint/2010/main" val="1611740374"/>
       </p:ext>
     </p:extLst>
   </p:cSld>
@@ -4090,7 +5838,7 @@
 </p:sld>
 </file>
 
-<file path=ppt/slides/slide10.xml><?xml version="1.0" encoding="utf-8"?>
+<file path=ppt/slides/slide11.xml><?xml version="1.0" encoding="utf-8"?>
 <p:sld xmlns:a="http://schemas.openxmlformats.org/drawingml/2006/main" xmlns:r="http://schemas.openxmlformats.org/officeDocument/2006/relationships" xmlns:p="http://schemas.openxmlformats.org/presentationml/2006/main">
   <p:cSld>
     <p:spTree>
@@ -5888,7 +7636,7 @@
 </p:sld>
 </file>
 
-<file path=ppt/slides/slide11.xml><?xml version="1.0" encoding="utf-8"?>
+<file path=ppt/slides/slide12.xml><?xml version="1.0" encoding="utf-8"?>
 <p:sld xmlns:a="http://schemas.openxmlformats.org/drawingml/2006/main" xmlns:r="http://schemas.openxmlformats.org/officeDocument/2006/relationships" xmlns:p="http://schemas.openxmlformats.org/presentationml/2006/main">
   <p:cSld>
     <p:spTree>
@@ -6518,6 +8266,606 @@
 </file>
 
 <file path=ppt/slides/slide2.xml><?xml version="1.0" encoding="utf-8"?>
+<p:sld xmlns:a="http://schemas.openxmlformats.org/drawingml/2006/main" xmlns:r="http://schemas.openxmlformats.org/officeDocument/2006/relationships" xmlns:p="http://schemas.openxmlformats.org/presentationml/2006/main">
+  <p:cSld>
+    <p:spTree>
+      <p:nvGrpSpPr>
+        <p:cNvPr id="1" name=""/>
+        <p:cNvGrpSpPr/>
+        <p:nvPr/>
+      </p:nvGrpSpPr>
+      <p:grpSpPr>
+        <a:xfrm>
+          <a:off x="0" y="0"/>
+          <a:ext cx="0" cy="0"/>
+          <a:chOff x="0" y="0"/>
+          <a:chExt cx="0" cy="0"/>
+        </a:xfrm>
+      </p:grpSpPr>
+      <p:sp>
+        <p:nvSpPr>
+          <p:cNvPr id="5" name="TextBox 4">
+            <a:extLst>
+              <a:ext uri="{FF2B5EF4-FFF2-40B4-BE49-F238E27FC236}">
+                <a16:creationId xmlns:a16="http://schemas.microsoft.com/office/drawing/2014/main" id="{1EF37BDE-B2E1-48B2-B091-E8439281D90D}"/>
+              </a:ext>
+            </a:extLst>
+          </p:cNvPr>
+          <p:cNvSpPr txBox="1"/>
+          <p:nvPr/>
+        </p:nvSpPr>
+        <p:spPr>
+          <a:xfrm>
+            <a:off x="1297577" y="1324121"/>
+            <a:ext cx="9596846" cy="923330"/>
+          </a:xfrm>
+          <a:prstGeom prst="rect">
+            <a:avLst/>
+          </a:prstGeom>
+          <a:noFill/>
+        </p:spPr>
+        <p:txBody>
+          <a:bodyPr wrap="square" rtlCol="0">
+            <a:spAutoFit/>
+          </a:bodyPr>
+          <a:lstStyle/>
+          <a:p>
+            <a:r>
+              <a:rPr lang="ko-KR" altLang="en-US" dirty="0"/>
+              <a:t>그룹 생성</a:t>
+            </a:r>
+            <a:endParaRPr lang="en-US" altLang="ko-KR" dirty="0"/>
+          </a:p>
+          <a:p>
+            <a:endParaRPr lang="en-US" altLang="ko-KR" dirty="0"/>
+          </a:p>
+          <a:p>
+            <a:endParaRPr lang="ko-KR" altLang="en-US" dirty="0"/>
+          </a:p>
+        </p:txBody>
+      </p:sp>
+      <p:sp>
+        <p:nvSpPr>
+          <p:cNvPr id="6" name="직사각형 5">
+            <a:extLst>
+              <a:ext uri="{FF2B5EF4-FFF2-40B4-BE49-F238E27FC236}">
+                <a16:creationId xmlns:a16="http://schemas.microsoft.com/office/drawing/2014/main" id="{5ADB0028-D0CF-405E-A531-E45EB63ACD7E}"/>
+              </a:ext>
+            </a:extLst>
+          </p:cNvPr>
+          <p:cNvSpPr/>
+          <p:nvPr/>
+        </p:nvSpPr>
+        <p:spPr>
+          <a:xfrm>
+            <a:off x="1297577" y="1938072"/>
+            <a:ext cx="9596846" cy="2893174"/>
+          </a:xfrm>
+          <a:prstGeom prst="rect">
+            <a:avLst/>
+          </a:prstGeom>
+        </p:spPr>
+        <p:style>
+          <a:lnRef idx="2">
+            <a:schemeClr val="accent1"/>
+          </a:lnRef>
+          <a:fillRef idx="1">
+            <a:schemeClr val="lt1"/>
+          </a:fillRef>
+          <a:effectRef idx="0">
+            <a:schemeClr val="accent1"/>
+          </a:effectRef>
+          <a:fontRef idx="minor">
+            <a:schemeClr val="dk1"/>
+          </a:fontRef>
+        </p:style>
+        <p:txBody>
+          <a:bodyPr rtlCol="0" anchor="t"/>
+          <a:lstStyle/>
+          <a:p>
+            <a:pPr algn="r"/>
+            <a:endParaRPr lang="ko-KR" altLang="en-US" sz="1400" dirty="0"/>
+          </a:p>
+        </p:txBody>
+      </p:sp>
+      <p:sp>
+        <p:nvSpPr>
+          <p:cNvPr id="7" name="직사각형 6">
+            <a:extLst>
+              <a:ext uri="{FF2B5EF4-FFF2-40B4-BE49-F238E27FC236}">
+                <a16:creationId xmlns:a16="http://schemas.microsoft.com/office/drawing/2014/main" id="{8D9DC2DA-2C2B-4B19-92FE-980B4818261E}"/>
+              </a:ext>
+            </a:extLst>
+          </p:cNvPr>
+          <p:cNvSpPr/>
+          <p:nvPr/>
+        </p:nvSpPr>
+        <p:spPr>
+          <a:xfrm>
+            <a:off x="5044440" y="4471112"/>
+            <a:ext cx="680168" cy="300446"/>
+          </a:xfrm>
+          <a:prstGeom prst="rect">
+            <a:avLst/>
+          </a:prstGeom>
+          <a:solidFill>
+            <a:schemeClr val="accent6"/>
+          </a:solidFill>
+          <a:ln>
+            <a:noFill/>
+          </a:ln>
+        </p:spPr>
+        <p:style>
+          <a:lnRef idx="0">
+            <a:scrgbClr r="0" g="0" b="0"/>
+          </a:lnRef>
+          <a:fillRef idx="0">
+            <a:scrgbClr r="0" g="0" b="0"/>
+          </a:fillRef>
+          <a:effectRef idx="0">
+            <a:scrgbClr r="0" g="0" b="0"/>
+          </a:effectRef>
+          <a:fontRef idx="minor">
+            <a:schemeClr val="lt1"/>
+          </a:fontRef>
+        </p:style>
+        <p:txBody>
+          <a:bodyPr rtlCol="0" anchor="ctr"/>
+          <a:lstStyle/>
+          <a:p>
+            <a:pPr algn="ctr"/>
+            <a:r>
+              <a:rPr lang="ko-KR" altLang="en-US" sz="1200" b="1" dirty="0"/>
+              <a:t>생성 </a:t>
+            </a:r>
+          </a:p>
+        </p:txBody>
+      </p:sp>
+      <p:graphicFrame>
+        <p:nvGraphicFramePr>
+          <p:cNvPr id="11" name="표 2">
+            <a:extLst>
+              <a:ext uri="{FF2B5EF4-FFF2-40B4-BE49-F238E27FC236}">
+                <a16:creationId xmlns:a16="http://schemas.microsoft.com/office/drawing/2014/main" id="{86F05277-67A9-4AC2-AE3B-41E89E8A8FD9}"/>
+              </a:ext>
+            </a:extLst>
+          </p:cNvPr>
+          <p:cNvGraphicFramePr>
+            <a:graphicFrameLocks noGrp="1"/>
+          </p:cNvGraphicFramePr>
+          <p:nvPr>
+            <p:extLst>
+              <p:ext uri="{D42A27DB-BD31-4B8C-83A1-F6EECF244321}">
+                <p14:modId xmlns:p14="http://schemas.microsoft.com/office/powerpoint/2010/main" val="1206137075"/>
+              </p:ext>
+            </p:extLst>
+          </p:nvPr>
+        </p:nvGraphicFramePr>
+        <p:xfrm>
+          <a:off x="1519835" y="2119721"/>
+          <a:ext cx="9152330" cy="1699804"/>
+        </p:xfrm>
+        <a:graphic>
+          <a:graphicData uri="http://schemas.openxmlformats.org/drawingml/2006/table">
+            <a:tbl>
+              <a:tblPr firstRow="1" bandRow="1">
+                <a:tableStyleId>{D27102A9-8310-4765-A935-A1911B00CA55}</a:tableStyleId>
+              </a:tblPr>
+              <a:tblGrid>
+                <a:gridCol w="2172594">
+                  <a:extLst>
+                    <a:ext uri="{9D8B030D-6E8A-4147-A177-3AD203B41FA5}">
+                      <a16:colId xmlns:a16="http://schemas.microsoft.com/office/drawing/2014/main" val="215400847"/>
+                    </a:ext>
+                  </a:extLst>
+                </a:gridCol>
+                <a:gridCol w="6979736">
+                  <a:extLst>
+                    <a:ext uri="{9D8B030D-6E8A-4147-A177-3AD203B41FA5}">
+                      <a16:colId xmlns:a16="http://schemas.microsoft.com/office/drawing/2014/main" val="2666341767"/>
+                    </a:ext>
+                  </a:extLst>
+                </a:gridCol>
+              </a:tblGrid>
+              <a:tr h="805354">
+                <a:tc>
+                  <a:txBody>
+                    <a:bodyPr/>
+                    <a:lstStyle/>
+                    <a:p>
+                      <a:pPr algn="ctr" latinLnBrk="1"/>
+                      <a:r>
+                        <a:rPr lang="ko-KR" altLang="en-US" sz="1100" dirty="0" err="1"/>
+                        <a:t>그룹명</a:t>
+                      </a:r>
+                      <a:r>
+                        <a:rPr lang="ko-KR" altLang="en-US" sz="1100" dirty="0"/>
+                        <a:t> </a:t>
+                      </a:r>
+                    </a:p>
+                  </a:txBody>
+                  <a:tcPr anchor="ctr"/>
+                </a:tc>
+                <a:tc>
+                  <a:txBody>
+                    <a:bodyPr/>
+                    <a:lstStyle/>
+                    <a:p>
+                      <a:pPr algn="ctr" latinLnBrk="1"/>
+                      <a:r>
+                        <a:rPr lang="en-US" altLang="ko-KR" sz="1100" dirty="0"/>
+                        <a:t>SOLAFY</a:t>
+                      </a:r>
+                      <a:endParaRPr lang="ko-KR" altLang="en-US" sz="1100" dirty="0"/>
+                    </a:p>
+                  </a:txBody>
+                  <a:tcPr anchor="ctr"/>
+                </a:tc>
+                <a:extLst>
+                  <a:ext uri="{0D108BD9-81ED-4DB2-BD59-A6C34878D82A}">
+                    <a16:rowId xmlns:a16="http://schemas.microsoft.com/office/drawing/2014/main" val="3674311876"/>
+                  </a:ext>
+                </a:extLst>
+              </a:tr>
+              <a:tr h="447225">
+                <a:tc>
+                  <a:txBody>
+                    <a:bodyPr/>
+                    <a:lstStyle/>
+                    <a:p>
+                      <a:pPr algn="ctr" latinLnBrk="1"/>
+                      <a:r>
+                        <a:rPr lang="ko-KR" altLang="en-US" sz="1100" b="1" dirty="0"/>
+                        <a:t>그룹</a:t>
+                      </a:r>
+                      <a:r>
+                        <a:rPr lang="en-US" altLang="ko-KR" sz="1100" b="1" dirty="0"/>
+                        <a:t> </a:t>
+                      </a:r>
+                      <a:r>
+                        <a:rPr lang="ko-KR" altLang="en-US" sz="1100" b="1" dirty="0"/>
+                        <a:t>설명</a:t>
+                      </a:r>
+                    </a:p>
+                  </a:txBody>
+                  <a:tcPr anchor="ctr"/>
+                </a:tc>
+                <a:tc>
+                  <a:txBody>
+                    <a:bodyPr/>
+                    <a:lstStyle/>
+                    <a:p>
+                      <a:pPr algn="ctr" latinLnBrk="1"/>
+                      <a:r>
+                        <a:rPr lang="ko-KR" altLang="en-US" sz="1100" dirty="0"/>
+                        <a:t>안녕하세요 </a:t>
+                      </a:r>
+                      <a:r>
+                        <a:rPr lang="en-US" altLang="ko-KR" sz="1100" dirty="0"/>
+                        <a:t>SOLAFY</a:t>
+                      </a:r>
+                      <a:r>
+                        <a:rPr lang="ko-KR" altLang="en-US" sz="1100" dirty="0"/>
+                        <a:t>의 </a:t>
+                      </a:r>
+                      <a:r>
+                        <a:rPr lang="en-US" altLang="ko-KR" sz="1100" dirty="0"/>
+                        <a:t>SOLAFY </a:t>
+                      </a:r>
+                      <a:r>
+                        <a:rPr lang="ko-KR" altLang="en-US" sz="1100" dirty="0"/>
+                        <a:t>그룹입니다</a:t>
+                      </a:r>
+                      <a:r>
+                        <a:rPr lang="en-US" altLang="ko-KR" sz="1100" dirty="0"/>
+                        <a:t>.</a:t>
+                      </a:r>
+                      <a:endParaRPr lang="ko-KR" altLang="en-US" sz="1100" dirty="0"/>
+                    </a:p>
+                  </a:txBody>
+                  <a:tcPr anchor="ctr"/>
+                </a:tc>
+                <a:extLst>
+                  <a:ext uri="{0D108BD9-81ED-4DB2-BD59-A6C34878D82A}">
+                    <a16:rowId xmlns:a16="http://schemas.microsoft.com/office/drawing/2014/main" val="3680400248"/>
+                  </a:ext>
+                </a:extLst>
+              </a:tr>
+              <a:tr h="447225">
+                <a:tc>
+                  <a:txBody>
+                    <a:bodyPr/>
+                    <a:lstStyle/>
+                    <a:p>
+                      <a:pPr algn="ctr" latinLnBrk="1"/>
+                      <a:r>
+                        <a:rPr lang="ko-KR" altLang="en-US" sz="1100" b="1" dirty="0"/>
+                        <a:t>공개 설정</a:t>
+                      </a:r>
+                    </a:p>
+                  </a:txBody>
+                  <a:tcPr anchor="ctr"/>
+                </a:tc>
+                <a:tc>
+                  <a:txBody>
+                    <a:bodyPr/>
+                    <a:lstStyle/>
+                    <a:p>
+                      <a:pPr algn="ctr" latinLnBrk="1"/>
+                      <a:r>
+                        <a:rPr lang="en-US" altLang="ko-KR" sz="1100" dirty="0"/>
+                        <a:t>Public      Private</a:t>
+                      </a:r>
+                      <a:r>
+                        <a:rPr lang="ko-KR" altLang="en-US" sz="1100" dirty="0"/>
+                        <a:t> </a:t>
+                      </a:r>
+                    </a:p>
+                  </a:txBody>
+                  <a:tcPr anchor="ctr"/>
+                </a:tc>
+                <a:extLst>
+                  <a:ext uri="{0D108BD9-81ED-4DB2-BD59-A6C34878D82A}">
+                    <a16:rowId xmlns:a16="http://schemas.microsoft.com/office/drawing/2014/main" val="1360283255"/>
+                  </a:ext>
+                </a:extLst>
+              </a:tr>
+            </a:tbl>
+          </a:graphicData>
+        </a:graphic>
+      </p:graphicFrame>
+      <p:sp>
+        <p:nvSpPr>
+          <p:cNvPr id="12" name="직사각형 11">
+            <a:extLst>
+              <a:ext uri="{FF2B5EF4-FFF2-40B4-BE49-F238E27FC236}">
+                <a16:creationId xmlns:a16="http://schemas.microsoft.com/office/drawing/2014/main" id="{3945E1DE-755A-417C-A71D-8F0FB7891A78}"/>
+              </a:ext>
+            </a:extLst>
+          </p:cNvPr>
+          <p:cNvSpPr/>
+          <p:nvPr/>
+        </p:nvSpPr>
+        <p:spPr>
+          <a:xfrm>
+            <a:off x="5879741" y="4471112"/>
+            <a:ext cx="680168" cy="300446"/>
+          </a:xfrm>
+          <a:prstGeom prst="rect">
+            <a:avLst/>
+          </a:prstGeom>
+          <a:solidFill>
+            <a:schemeClr val="accent2"/>
+          </a:solidFill>
+          <a:ln>
+            <a:noFill/>
+          </a:ln>
+        </p:spPr>
+        <p:style>
+          <a:lnRef idx="0">
+            <a:scrgbClr r="0" g="0" b="0"/>
+          </a:lnRef>
+          <a:fillRef idx="0">
+            <a:scrgbClr r="0" g="0" b="0"/>
+          </a:fillRef>
+          <a:effectRef idx="0">
+            <a:scrgbClr r="0" g="0" b="0"/>
+          </a:effectRef>
+          <a:fontRef idx="minor">
+            <a:schemeClr val="lt1"/>
+          </a:fontRef>
+        </p:style>
+        <p:txBody>
+          <a:bodyPr rtlCol="0" anchor="ctr"/>
+          <a:lstStyle/>
+          <a:p>
+            <a:pPr algn="ctr"/>
+            <a:r>
+              <a:rPr lang="ko-KR" altLang="en-US" sz="1200" b="1" dirty="0"/>
+              <a:t>취소</a:t>
+            </a:r>
+          </a:p>
+        </p:txBody>
+      </p:sp>
+      <p:sp>
+        <p:nvSpPr>
+          <p:cNvPr id="13" name="직사각형 12">
+            <a:extLst>
+              <a:ext uri="{FF2B5EF4-FFF2-40B4-BE49-F238E27FC236}">
+                <a16:creationId xmlns:a16="http://schemas.microsoft.com/office/drawing/2014/main" id="{6DC2C3C6-5E9A-4880-8ECE-57833B5C22D8}"/>
+              </a:ext>
+            </a:extLst>
+          </p:cNvPr>
+          <p:cNvSpPr/>
+          <p:nvPr/>
+        </p:nvSpPr>
+        <p:spPr>
+          <a:xfrm>
+            <a:off x="8740139" y="2387330"/>
+            <a:ext cx="918293" cy="300446"/>
+          </a:xfrm>
+          <a:prstGeom prst="rect">
+            <a:avLst/>
+          </a:prstGeom>
+          <a:solidFill>
+            <a:schemeClr val="accent6"/>
+          </a:solidFill>
+          <a:ln>
+            <a:noFill/>
+          </a:ln>
+        </p:spPr>
+        <p:style>
+          <a:lnRef idx="0">
+            <a:scrgbClr r="0" g="0" b="0"/>
+          </a:lnRef>
+          <a:fillRef idx="0">
+            <a:scrgbClr r="0" g="0" b="0"/>
+          </a:fillRef>
+          <a:effectRef idx="0">
+            <a:scrgbClr r="0" g="0" b="0"/>
+          </a:effectRef>
+          <a:fontRef idx="minor">
+            <a:schemeClr val="lt1"/>
+          </a:fontRef>
+        </p:style>
+        <p:txBody>
+          <a:bodyPr rtlCol="0" anchor="ctr"/>
+          <a:lstStyle/>
+          <a:p>
+            <a:pPr algn="ctr"/>
+            <a:r>
+              <a:rPr lang="ko-KR" altLang="en-US" sz="1200" b="1" dirty="0"/>
+              <a:t>중복 확인</a:t>
+            </a:r>
+          </a:p>
+        </p:txBody>
+      </p:sp>
+      <p:sp>
+        <p:nvSpPr>
+          <p:cNvPr id="22" name="타원 21">
+            <a:extLst>
+              <a:ext uri="{FF2B5EF4-FFF2-40B4-BE49-F238E27FC236}">
+                <a16:creationId xmlns:a16="http://schemas.microsoft.com/office/drawing/2014/main" id="{6DB2A7EE-A765-4097-ADF3-3AFAE58A76AC}"/>
+              </a:ext>
+            </a:extLst>
+          </p:cNvPr>
+          <p:cNvSpPr/>
+          <p:nvPr/>
+        </p:nvSpPr>
+        <p:spPr>
+          <a:xfrm>
+            <a:off x="7073903" y="3512872"/>
+            <a:ext cx="152400" cy="160866"/>
+          </a:xfrm>
+          <a:prstGeom prst="ellipse">
+            <a:avLst/>
+          </a:prstGeom>
+        </p:spPr>
+        <p:style>
+          <a:lnRef idx="2">
+            <a:schemeClr val="accent4"/>
+          </a:lnRef>
+          <a:fillRef idx="1">
+            <a:schemeClr val="lt1"/>
+          </a:fillRef>
+          <a:effectRef idx="0">
+            <a:schemeClr val="accent4"/>
+          </a:effectRef>
+          <a:fontRef idx="minor">
+            <a:schemeClr val="dk1"/>
+          </a:fontRef>
+        </p:style>
+        <p:txBody>
+          <a:bodyPr rtlCol="0" anchor="ctr"/>
+          <a:lstStyle/>
+          <a:p>
+            <a:pPr algn="ctr"/>
+            <a:endParaRPr lang="ko-KR" altLang="en-US"/>
+          </a:p>
+        </p:txBody>
+      </p:sp>
+      <p:sp>
+        <p:nvSpPr>
+          <p:cNvPr id="2" name="타원 1">
+            <a:extLst>
+              <a:ext uri="{FF2B5EF4-FFF2-40B4-BE49-F238E27FC236}">
+                <a16:creationId xmlns:a16="http://schemas.microsoft.com/office/drawing/2014/main" id="{6D753B8C-6000-4CF0-9CAA-1B2D8E71DAF3}"/>
+              </a:ext>
+            </a:extLst>
+          </p:cNvPr>
+          <p:cNvSpPr/>
+          <p:nvPr/>
+        </p:nvSpPr>
+        <p:spPr>
+          <a:xfrm>
+            <a:off x="7107240" y="3548061"/>
+            <a:ext cx="85725" cy="90487"/>
+          </a:xfrm>
+          <a:prstGeom prst="ellipse">
+            <a:avLst/>
+          </a:prstGeom>
+        </p:spPr>
+        <p:style>
+          <a:lnRef idx="1">
+            <a:schemeClr val="accent5"/>
+          </a:lnRef>
+          <a:fillRef idx="3">
+            <a:schemeClr val="accent5"/>
+          </a:fillRef>
+          <a:effectRef idx="2">
+            <a:schemeClr val="accent5"/>
+          </a:effectRef>
+          <a:fontRef idx="minor">
+            <a:schemeClr val="lt1"/>
+          </a:fontRef>
+        </p:style>
+        <p:txBody>
+          <a:bodyPr rtlCol="0" anchor="ctr"/>
+          <a:lstStyle/>
+          <a:p>
+            <a:pPr algn="ctr"/>
+            <a:endParaRPr lang="ko-KR" altLang="en-US"/>
+          </a:p>
+        </p:txBody>
+      </p:sp>
+      <p:sp>
+        <p:nvSpPr>
+          <p:cNvPr id="23" name="타원 22">
+            <a:extLst>
+              <a:ext uri="{FF2B5EF4-FFF2-40B4-BE49-F238E27FC236}">
+                <a16:creationId xmlns:a16="http://schemas.microsoft.com/office/drawing/2014/main" id="{08D7FDFE-F604-416E-BB6F-8170739FD9B5}"/>
+              </a:ext>
+            </a:extLst>
+          </p:cNvPr>
+          <p:cNvSpPr/>
+          <p:nvPr/>
+        </p:nvSpPr>
+        <p:spPr>
+          <a:xfrm>
+            <a:off x="7854953" y="3512872"/>
+            <a:ext cx="152400" cy="160866"/>
+          </a:xfrm>
+          <a:prstGeom prst="ellipse">
+            <a:avLst/>
+          </a:prstGeom>
+        </p:spPr>
+        <p:style>
+          <a:lnRef idx="2">
+            <a:schemeClr val="accent4"/>
+          </a:lnRef>
+          <a:fillRef idx="1">
+            <a:schemeClr val="lt1"/>
+          </a:fillRef>
+          <a:effectRef idx="0">
+            <a:schemeClr val="accent4"/>
+          </a:effectRef>
+          <a:fontRef idx="minor">
+            <a:schemeClr val="dk1"/>
+          </a:fontRef>
+        </p:style>
+        <p:txBody>
+          <a:bodyPr rtlCol="0" anchor="ctr"/>
+          <a:lstStyle/>
+          <a:p>
+            <a:pPr algn="ctr"/>
+            <a:endParaRPr lang="ko-KR" altLang="en-US"/>
+          </a:p>
+        </p:txBody>
+      </p:sp>
+    </p:spTree>
+    <p:extLst>
+      <p:ext uri="{BB962C8B-B14F-4D97-AF65-F5344CB8AC3E}">
+        <p14:creationId xmlns:p14="http://schemas.microsoft.com/office/powerpoint/2010/main" val="4270958819"/>
+      </p:ext>
+    </p:extLst>
+  </p:cSld>
+  <p:clrMapOvr>
+    <a:masterClrMapping/>
+  </p:clrMapOvr>
+</p:sld>
+</file>
+
+<file path=ppt/slides/slide3.xml><?xml version="1.0" encoding="utf-8"?>
 <p:sld xmlns:a="http://schemas.openxmlformats.org/drawingml/2006/main" xmlns:r="http://schemas.openxmlformats.org/officeDocument/2006/relationships" xmlns:p="http://schemas.openxmlformats.org/presentationml/2006/main">
   <p:cSld>
     <p:spTree>
@@ -7957,7 +10305,7 @@
 </p:sld>
 </file>
 
-<file path=ppt/slides/slide3.xml><?xml version="1.0" encoding="utf-8"?>
+<file path=ppt/slides/slide4.xml><?xml version="1.0" encoding="utf-8"?>
 <p:sld xmlns:a="http://schemas.openxmlformats.org/drawingml/2006/main" xmlns:r="http://schemas.openxmlformats.org/officeDocument/2006/relationships" xmlns:p="http://schemas.openxmlformats.org/presentationml/2006/main">
   <p:cSld>
     <p:spTree>
@@ -9725,7 +12073,7 @@
 </p:sld>
 </file>
 
-<file path=ppt/slides/slide4.xml><?xml version="1.0" encoding="utf-8"?>
+<file path=ppt/slides/slide5.xml><?xml version="1.0" encoding="utf-8"?>
 <p:sld xmlns:a="http://schemas.openxmlformats.org/drawingml/2006/main" xmlns:r="http://schemas.openxmlformats.org/officeDocument/2006/relationships" xmlns:p="http://schemas.openxmlformats.org/presentationml/2006/main">
   <p:cSld>
     <p:spTree>
@@ -11186,7 +13534,7 @@
 </p:sld>
 </file>
 
-<file path=ppt/slides/slide5.xml><?xml version="1.0" encoding="utf-8"?>
+<file path=ppt/slides/slide6.xml><?xml version="1.0" encoding="utf-8"?>
 <p:sld xmlns:a="http://schemas.openxmlformats.org/drawingml/2006/main" xmlns:r="http://schemas.openxmlformats.org/officeDocument/2006/relationships" xmlns:p="http://schemas.openxmlformats.org/presentationml/2006/main">
   <p:cSld>
     <p:spTree>
@@ -12542,7 +14890,7 @@
 </p:sld>
 </file>
 
-<file path=ppt/slides/slide6.xml><?xml version="1.0" encoding="utf-8"?>
+<file path=ppt/slides/slide7.xml><?xml version="1.0" encoding="utf-8"?>
 <p:sld xmlns:a="http://schemas.openxmlformats.org/drawingml/2006/main" xmlns:r="http://schemas.openxmlformats.org/officeDocument/2006/relationships" xmlns:p="http://schemas.openxmlformats.org/presentationml/2006/main">
   <p:cSld>
     <p:spTree>
@@ -13879,7 +16227,7 @@
 </p:sld>
 </file>
 
-<file path=ppt/slides/slide7.xml><?xml version="1.0" encoding="utf-8"?>
+<file path=ppt/slides/slide8.xml><?xml version="1.0" encoding="utf-8"?>
 <p:sld xmlns:a="http://schemas.openxmlformats.org/drawingml/2006/main" xmlns:r="http://schemas.openxmlformats.org/officeDocument/2006/relationships" xmlns:p="http://schemas.openxmlformats.org/presentationml/2006/main">
   <p:cSld>
     <p:spTree>
@@ -15350,7 +17698,7 @@
 </p:sld>
 </file>
 
-<file path=ppt/slides/slide8.xml><?xml version="1.0" encoding="utf-8"?>
+<file path=ppt/slides/slide9.xml><?xml version="1.0" encoding="utf-8"?>
 <p:sld xmlns:a="http://schemas.openxmlformats.org/drawingml/2006/main" xmlns:r="http://schemas.openxmlformats.org/officeDocument/2006/relationships" xmlns:p="http://schemas.openxmlformats.org/presentationml/2006/main">
   <p:cSld>
     <p:spTree>
@@ -16356,1162 +18704,6 @@
     <p:extLst>
       <p:ext uri="{BB962C8B-B14F-4D97-AF65-F5344CB8AC3E}">
         <p14:creationId xmlns:p14="http://schemas.microsoft.com/office/powerpoint/2010/main" val="979424029"/>
-      </p:ext>
-    </p:extLst>
-  </p:cSld>
-  <p:clrMapOvr>
-    <a:masterClrMapping/>
-  </p:clrMapOvr>
-</p:sld>
-</file>
-
-<file path=ppt/slides/slide9.xml><?xml version="1.0" encoding="utf-8"?>
-<p:sld xmlns:a="http://schemas.openxmlformats.org/drawingml/2006/main" xmlns:r="http://schemas.openxmlformats.org/officeDocument/2006/relationships" xmlns:p="http://schemas.openxmlformats.org/presentationml/2006/main">
-  <p:cSld>
-    <p:spTree>
-      <p:nvGrpSpPr>
-        <p:cNvPr id="1" name=""/>
-        <p:cNvGrpSpPr/>
-        <p:nvPr/>
-      </p:nvGrpSpPr>
-      <p:grpSpPr>
-        <a:xfrm>
-          <a:off x="0" y="0"/>
-          <a:ext cx="0" cy="0"/>
-          <a:chOff x="0" y="0"/>
-          <a:chExt cx="0" cy="0"/>
-        </a:xfrm>
-      </p:grpSpPr>
-      <p:sp>
-        <p:nvSpPr>
-          <p:cNvPr id="4" name="직사각형 3">
-            <a:extLst>
-              <a:ext uri="{FF2B5EF4-FFF2-40B4-BE49-F238E27FC236}">
-                <a16:creationId xmlns:a16="http://schemas.microsoft.com/office/drawing/2014/main" id="{B1D1296F-1DCE-45BE-A689-E665097A2AEA}"/>
-              </a:ext>
-            </a:extLst>
-          </p:cNvPr>
-          <p:cNvSpPr/>
-          <p:nvPr/>
-        </p:nvSpPr>
-        <p:spPr>
-          <a:xfrm>
-            <a:off x="1402269" y="2102999"/>
-            <a:ext cx="9596846" cy="613951"/>
-          </a:xfrm>
-          <a:prstGeom prst="rect">
-            <a:avLst/>
-          </a:prstGeom>
-        </p:spPr>
-        <p:style>
-          <a:lnRef idx="2">
-            <a:schemeClr val="dk1"/>
-          </a:lnRef>
-          <a:fillRef idx="1">
-            <a:schemeClr val="lt1"/>
-          </a:fillRef>
-          <a:effectRef idx="0">
-            <a:schemeClr val="dk1"/>
-          </a:effectRef>
-          <a:fontRef idx="minor">
-            <a:schemeClr val="dk1"/>
-          </a:fontRef>
-        </p:style>
-        <p:txBody>
-          <a:bodyPr rtlCol="0" anchor="ctr"/>
-          <a:lstStyle/>
-          <a:p>
-            <a:pPr algn="ctr"/>
-            <a:r>
-              <a:rPr lang="ko-KR" altLang="en-US" sz="1200" dirty="0"/>
-              <a:t>그룹 공지</a:t>
-            </a:r>
-            <a:r>
-              <a:rPr lang="en-US" altLang="ko-KR" sz="1200" dirty="0"/>
-              <a:t>  | </a:t>
-            </a:r>
-            <a:r>
-              <a:rPr lang="ko-KR" altLang="en-US" sz="1200" dirty="0"/>
-              <a:t>그룹 문제집 </a:t>
-            </a:r>
-            <a:r>
-              <a:rPr lang="en-US" altLang="ko-KR" sz="1200" dirty="0"/>
-              <a:t>| </a:t>
-            </a:r>
-            <a:r>
-              <a:rPr lang="ko-KR" altLang="en-US" sz="1200" dirty="0"/>
-              <a:t>문제</a:t>
-            </a:r>
-            <a:r>
-              <a:rPr lang="en-US" altLang="ko-KR" sz="1200" dirty="0"/>
-              <a:t> </a:t>
-            </a:r>
-            <a:r>
-              <a:rPr lang="ko-KR" altLang="en-US" sz="1200" dirty="0"/>
-              <a:t>대회</a:t>
-            </a:r>
-            <a:r>
-              <a:rPr lang="en-US" altLang="ko-KR" sz="1200" dirty="0"/>
-              <a:t> | </a:t>
-            </a:r>
-            <a:r>
-              <a:rPr lang="ko-KR" altLang="en-US" sz="1200" dirty="0" err="1">
-                <a:solidFill>
-                  <a:schemeClr val="tx1"/>
-                </a:solidFill>
-              </a:rPr>
-              <a:t>그룹원</a:t>
-            </a:r>
-            <a:r>
-              <a:rPr lang="ko-KR" altLang="en-US" sz="1200" dirty="0">
-                <a:solidFill>
-                  <a:schemeClr val="tx1"/>
-                </a:solidFill>
-              </a:rPr>
-              <a:t> 보기 </a:t>
-            </a:r>
-            <a:r>
-              <a:rPr lang="en-US" altLang="ko-KR" sz="1200" dirty="0">
-                <a:solidFill>
-                  <a:schemeClr val="tx1"/>
-                </a:solidFill>
-              </a:rPr>
-              <a:t> </a:t>
-            </a:r>
-            <a:r>
-              <a:rPr lang="en-US" altLang="ko-KR" sz="1200" dirty="0"/>
-              <a:t>|  </a:t>
-            </a:r>
-            <a:r>
-              <a:rPr lang="ko-KR" altLang="en-US" sz="1200" b="1" dirty="0">
-                <a:solidFill>
-                  <a:srgbClr val="00B0F0"/>
-                </a:solidFill>
-              </a:rPr>
-              <a:t>그룹 수정</a:t>
-            </a:r>
-            <a:r>
-              <a:rPr lang="en-US" altLang="ko-KR" sz="1200" dirty="0"/>
-              <a:t>(</a:t>
-            </a:r>
-            <a:r>
-              <a:rPr lang="ko-KR" altLang="en-US" sz="1200" dirty="0"/>
-              <a:t>관리자의 경우</a:t>
-            </a:r>
-            <a:r>
-              <a:rPr lang="en-US" altLang="ko-KR" sz="1200" dirty="0"/>
-              <a:t>)</a:t>
-            </a:r>
-            <a:endParaRPr lang="ko-KR" altLang="en-US" sz="1200" dirty="0"/>
-          </a:p>
-        </p:txBody>
-      </p:sp>
-      <p:sp>
-        <p:nvSpPr>
-          <p:cNvPr id="5" name="TextBox 4">
-            <a:extLst>
-              <a:ext uri="{FF2B5EF4-FFF2-40B4-BE49-F238E27FC236}">
-                <a16:creationId xmlns:a16="http://schemas.microsoft.com/office/drawing/2014/main" id="{1EF37BDE-B2E1-48B2-B091-E8439281D90D}"/>
-              </a:ext>
-            </a:extLst>
-          </p:cNvPr>
-          <p:cNvSpPr txBox="1"/>
-          <p:nvPr/>
-        </p:nvSpPr>
-        <p:spPr>
-          <a:xfrm>
-            <a:off x="1402269" y="2943371"/>
-            <a:ext cx="9596846" cy="923330"/>
-          </a:xfrm>
-          <a:prstGeom prst="rect">
-            <a:avLst/>
-          </a:prstGeom>
-          <a:noFill/>
-        </p:spPr>
-        <p:txBody>
-          <a:bodyPr wrap="square" rtlCol="0">
-            <a:spAutoFit/>
-          </a:bodyPr>
-          <a:lstStyle/>
-          <a:p>
-            <a:r>
-              <a:rPr lang="ko-KR" altLang="en-US" dirty="0"/>
-              <a:t>그룹 수정</a:t>
-            </a:r>
-            <a:endParaRPr lang="en-US" altLang="ko-KR" dirty="0"/>
-          </a:p>
-          <a:p>
-            <a:endParaRPr lang="en-US" altLang="ko-KR" dirty="0"/>
-          </a:p>
-          <a:p>
-            <a:endParaRPr lang="ko-KR" altLang="en-US" dirty="0"/>
-          </a:p>
-        </p:txBody>
-      </p:sp>
-      <p:sp>
-        <p:nvSpPr>
-          <p:cNvPr id="6" name="직사각형 5">
-            <a:extLst>
-              <a:ext uri="{FF2B5EF4-FFF2-40B4-BE49-F238E27FC236}">
-                <a16:creationId xmlns:a16="http://schemas.microsoft.com/office/drawing/2014/main" id="{5ADB0028-D0CF-405E-A531-E45EB63ACD7E}"/>
-              </a:ext>
-            </a:extLst>
-          </p:cNvPr>
-          <p:cNvSpPr/>
-          <p:nvPr/>
-        </p:nvSpPr>
-        <p:spPr>
-          <a:xfrm>
-            <a:off x="1402269" y="3785922"/>
-            <a:ext cx="9596846" cy="3072078"/>
-          </a:xfrm>
-          <a:prstGeom prst="rect">
-            <a:avLst/>
-          </a:prstGeom>
-        </p:spPr>
-        <p:style>
-          <a:lnRef idx="2">
-            <a:schemeClr val="accent1"/>
-          </a:lnRef>
-          <a:fillRef idx="1">
-            <a:schemeClr val="lt1"/>
-          </a:fillRef>
-          <a:effectRef idx="0">
-            <a:schemeClr val="accent1"/>
-          </a:effectRef>
-          <a:fontRef idx="minor">
-            <a:schemeClr val="dk1"/>
-          </a:fontRef>
-        </p:style>
-        <p:txBody>
-          <a:bodyPr rtlCol="0" anchor="t"/>
-          <a:lstStyle/>
-          <a:p>
-            <a:pPr algn="r"/>
-            <a:endParaRPr lang="ko-KR" altLang="en-US" sz="1400" dirty="0"/>
-          </a:p>
-        </p:txBody>
-      </p:sp>
-      <p:sp>
-        <p:nvSpPr>
-          <p:cNvPr id="7" name="직사각형 6">
-            <a:extLst>
-              <a:ext uri="{FF2B5EF4-FFF2-40B4-BE49-F238E27FC236}">
-                <a16:creationId xmlns:a16="http://schemas.microsoft.com/office/drawing/2014/main" id="{8D9DC2DA-2C2B-4B19-92FE-980B4818261E}"/>
-              </a:ext>
-            </a:extLst>
-          </p:cNvPr>
-          <p:cNvSpPr/>
-          <p:nvPr/>
-        </p:nvSpPr>
-        <p:spPr>
-          <a:xfrm>
-            <a:off x="5131715" y="6472893"/>
-            <a:ext cx="680168" cy="300446"/>
-          </a:xfrm>
-          <a:prstGeom prst="rect">
-            <a:avLst/>
-          </a:prstGeom>
-          <a:solidFill>
-            <a:schemeClr val="accent6"/>
-          </a:solidFill>
-          <a:ln>
-            <a:noFill/>
-          </a:ln>
-        </p:spPr>
-        <p:style>
-          <a:lnRef idx="0">
-            <a:scrgbClr r="0" g="0" b="0"/>
-          </a:lnRef>
-          <a:fillRef idx="0">
-            <a:scrgbClr r="0" g="0" b="0"/>
-          </a:fillRef>
-          <a:effectRef idx="0">
-            <a:scrgbClr r="0" g="0" b="0"/>
-          </a:effectRef>
-          <a:fontRef idx="minor">
-            <a:schemeClr val="lt1"/>
-          </a:fontRef>
-        </p:style>
-        <p:txBody>
-          <a:bodyPr rtlCol="0" anchor="ctr"/>
-          <a:lstStyle/>
-          <a:p>
-            <a:pPr algn="ctr"/>
-            <a:r>
-              <a:rPr lang="ko-KR" altLang="en-US" sz="1200" b="1" dirty="0"/>
-              <a:t>수정 </a:t>
-            </a:r>
-          </a:p>
-        </p:txBody>
-      </p:sp>
-      <p:sp>
-        <p:nvSpPr>
-          <p:cNvPr id="10" name="TextBox 9">
-            <a:extLst>
-              <a:ext uri="{FF2B5EF4-FFF2-40B4-BE49-F238E27FC236}">
-                <a16:creationId xmlns:a16="http://schemas.microsoft.com/office/drawing/2014/main" id="{05926AB8-8595-4108-BF4D-F89032026589}"/>
-              </a:ext>
-            </a:extLst>
-          </p:cNvPr>
-          <p:cNvSpPr txBox="1"/>
-          <p:nvPr/>
-        </p:nvSpPr>
-        <p:spPr>
-          <a:xfrm>
-            <a:off x="0" y="725556"/>
-            <a:ext cx="12191999" cy="527217"/>
-          </a:xfrm>
-          <a:prstGeom prst="rect">
-            <a:avLst/>
-          </a:prstGeom>
-        </p:spPr>
-        <p:style>
-          <a:lnRef idx="3">
-            <a:schemeClr val="lt1"/>
-          </a:lnRef>
-          <a:fillRef idx="1">
-            <a:schemeClr val="accent4"/>
-          </a:fillRef>
-          <a:effectRef idx="1">
-            <a:schemeClr val="accent4"/>
-          </a:effectRef>
-          <a:fontRef idx="minor">
-            <a:schemeClr val="lt1"/>
-          </a:fontRef>
-        </p:style>
-        <p:txBody>
-          <a:bodyPr wrap="square" rtlCol="0">
-            <a:noAutofit/>
-          </a:bodyPr>
-          <a:lstStyle/>
-          <a:p>
-            <a:pPr marL="0" marR="0" lvl="0" indent="0" algn="ctr" defTabSz="914400" rtl="0" eaLnBrk="1" fontAlgn="auto" latinLnBrk="1" hangingPunct="1">
-              <a:lnSpc>
-                <a:spcPct val="100000"/>
-              </a:lnSpc>
-              <a:spcBef>
-                <a:spcPts val="0"/>
-              </a:spcBef>
-              <a:spcAft>
-                <a:spcPts val="0"/>
-              </a:spcAft>
-              <a:buClrTx/>
-              <a:buSzTx/>
-              <a:buFontTx/>
-              <a:buNone/>
-              <a:tabLst/>
-              <a:defRPr/>
-            </a:pPr>
-            <a:r>
-              <a:rPr kumimoji="0" lang="en-US" altLang="ko-KR" sz="2800" b="1" i="0" u="none" strike="noStrike" kern="1200" cap="none" spc="0" normalizeH="0" baseline="0" noProof="0" dirty="0">
-                <a:ln>
-                  <a:noFill/>
-                </a:ln>
-                <a:solidFill>
-                  <a:prstClr val="white"/>
-                </a:solidFill>
-                <a:effectLst/>
-                <a:uLnTx/>
-                <a:uFillTx/>
-                <a:latin typeface="맑은 고딕" panose="020F0502020204030204"/>
-                <a:ea typeface="맑은 고딕" panose="020B0503020000020004" pitchFamily="50" charset="-127"/>
-                <a:cs typeface="+mn-cs"/>
-              </a:rPr>
-              <a:t>SOLAFY </a:t>
-            </a:r>
-            <a:r>
-              <a:rPr kumimoji="0" lang="en-US" altLang="ko-KR" sz="1400" b="0" i="0" u="none" strike="noStrike" kern="1200" cap="none" spc="0" normalizeH="0" baseline="0" noProof="0" dirty="0">
-                <a:ln>
-                  <a:noFill/>
-                </a:ln>
-                <a:solidFill>
-                  <a:prstClr val="white"/>
-                </a:solidFill>
-                <a:effectLst/>
-                <a:uLnTx/>
-                <a:uFillTx/>
-                <a:latin typeface="맑은 고딕" panose="020F0502020204030204"/>
-                <a:ea typeface="맑은 고딕" panose="020B0503020000020004" pitchFamily="50" charset="-127"/>
-                <a:cs typeface="+mn-cs"/>
-              </a:rPr>
-              <a:t>(</a:t>
-            </a:r>
-            <a:r>
-              <a:rPr kumimoji="0" lang="ko-KR" altLang="en-US" sz="1400" b="0" i="0" u="none" strike="noStrike" kern="1200" cap="none" spc="0" normalizeH="0" baseline="0" noProof="0" dirty="0">
-                <a:ln>
-                  <a:noFill/>
-                </a:ln>
-                <a:solidFill>
-                  <a:prstClr val="white"/>
-                </a:solidFill>
-                <a:effectLst/>
-                <a:uLnTx/>
-                <a:uFillTx/>
-                <a:latin typeface="맑은 고딕" panose="020F0502020204030204"/>
-                <a:ea typeface="맑은 고딕" panose="020B0503020000020004" pitchFamily="50" charset="-127"/>
-                <a:cs typeface="+mn-cs"/>
-              </a:rPr>
-              <a:t>그룹</a:t>
-            </a:r>
-            <a:r>
-              <a:rPr kumimoji="0" lang="en-US" altLang="ko-KR" sz="1400" b="0" i="0" u="none" strike="noStrike" kern="1200" cap="none" spc="0" normalizeH="0" baseline="0" noProof="0" dirty="0">
-                <a:ln>
-                  <a:noFill/>
-                </a:ln>
-                <a:solidFill>
-                  <a:prstClr val="white"/>
-                </a:solidFill>
-                <a:effectLst/>
-                <a:uLnTx/>
-                <a:uFillTx/>
-                <a:latin typeface="맑은 고딕" panose="020F0502020204030204"/>
-                <a:ea typeface="맑은 고딕" panose="020B0503020000020004" pitchFamily="50" charset="-127"/>
-                <a:cs typeface="+mn-cs"/>
-              </a:rPr>
-              <a:t> </a:t>
-            </a:r>
-            <a:r>
-              <a:rPr kumimoji="0" lang="ko-KR" altLang="en-US" sz="1400" b="0" i="0" u="none" strike="noStrike" kern="1200" cap="none" spc="0" normalizeH="0" baseline="0" noProof="0" dirty="0">
-                <a:ln>
-                  <a:noFill/>
-                </a:ln>
-                <a:solidFill>
-                  <a:prstClr val="white"/>
-                </a:solidFill>
-                <a:effectLst/>
-                <a:uLnTx/>
-                <a:uFillTx/>
-                <a:latin typeface="맑은 고딕" panose="020F0502020204030204"/>
-                <a:ea typeface="맑은 고딕" panose="020B0503020000020004" pitchFamily="50" charset="-127"/>
-                <a:cs typeface="+mn-cs"/>
-              </a:rPr>
-              <a:t>명</a:t>
-            </a:r>
-            <a:r>
-              <a:rPr kumimoji="0" lang="en-US" altLang="ko-KR" sz="1400" b="0" i="0" u="none" strike="noStrike" kern="1200" cap="none" spc="0" normalizeH="0" baseline="0" noProof="0" dirty="0">
-                <a:ln>
-                  <a:noFill/>
-                </a:ln>
-                <a:solidFill>
-                  <a:prstClr val="white"/>
-                </a:solidFill>
-                <a:effectLst/>
-                <a:uLnTx/>
-                <a:uFillTx/>
-                <a:latin typeface="맑은 고딕" panose="020F0502020204030204"/>
-                <a:ea typeface="맑은 고딕" panose="020B0503020000020004" pitchFamily="50" charset="-127"/>
-                <a:cs typeface="+mn-cs"/>
-              </a:rPr>
-              <a:t>)</a:t>
-            </a:r>
-            <a:endParaRPr kumimoji="0" lang="ko-KR" altLang="en-US" sz="1400" b="0" i="0" u="none" strike="noStrike" kern="1200" cap="none" spc="0" normalizeH="0" baseline="0" noProof="0" dirty="0">
-              <a:ln>
-                <a:noFill/>
-              </a:ln>
-              <a:solidFill>
-                <a:prstClr val="white"/>
-              </a:solidFill>
-              <a:effectLst/>
-              <a:uLnTx/>
-              <a:uFillTx/>
-              <a:latin typeface="맑은 고딕" panose="020F0502020204030204"/>
-              <a:ea typeface="맑은 고딕" panose="020B0503020000020004" pitchFamily="50" charset="-127"/>
-              <a:cs typeface="+mn-cs"/>
-            </a:endParaRPr>
-          </a:p>
-          <a:p>
-            <a:pPr algn="ctr"/>
-            <a:endParaRPr lang="ko-KR" altLang="en-US" dirty="0"/>
-          </a:p>
-        </p:txBody>
-      </p:sp>
-      <p:sp>
-        <p:nvSpPr>
-          <p:cNvPr id="12" name="직사각형 11">
-            <a:extLst>
-              <a:ext uri="{FF2B5EF4-FFF2-40B4-BE49-F238E27FC236}">
-                <a16:creationId xmlns:a16="http://schemas.microsoft.com/office/drawing/2014/main" id="{3945E1DE-755A-417C-A71D-8F0FB7891A78}"/>
-              </a:ext>
-            </a:extLst>
-          </p:cNvPr>
-          <p:cNvSpPr/>
-          <p:nvPr/>
-        </p:nvSpPr>
-        <p:spPr>
-          <a:xfrm>
-            <a:off x="5967016" y="6472893"/>
-            <a:ext cx="680168" cy="300446"/>
-          </a:xfrm>
-          <a:prstGeom prst="rect">
-            <a:avLst/>
-          </a:prstGeom>
-          <a:solidFill>
-            <a:schemeClr val="accent2"/>
-          </a:solidFill>
-          <a:ln>
-            <a:noFill/>
-          </a:ln>
-        </p:spPr>
-        <p:style>
-          <a:lnRef idx="0">
-            <a:scrgbClr r="0" g="0" b="0"/>
-          </a:lnRef>
-          <a:fillRef idx="0">
-            <a:scrgbClr r="0" g="0" b="0"/>
-          </a:fillRef>
-          <a:effectRef idx="0">
-            <a:scrgbClr r="0" g="0" b="0"/>
-          </a:effectRef>
-          <a:fontRef idx="minor">
-            <a:schemeClr val="lt1"/>
-          </a:fontRef>
-        </p:style>
-        <p:txBody>
-          <a:bodyPr rtlCol="0" anchor="ctr"/>
-          <a:lstStyle/>
-          <a:p>
-            <a:pPr algn="ctr"/>
-            <a:r>
-              <a:rPr lang="ko-KR" altLang="en-US" sz="1200" b="1" dirty="0"/>
-              <a:t>취소</a:t>
-            </a:r>
-          </a:p>
-        </p:txBody>
-      </p:sp>
-      <p:graphicFrame>
-        <p:nvGraphicFramePr>
-          <p:cNvPr id="2" name="표 2">
-            <a:extLst>
-              <a:ext uri="{FF2B5EF4-FFF2-40B4-BE49-F238E27FC236}">
-                <a16:creationId xmlns:a16="http://schemas.microsoft.com/office/drawing/2014/main" id="{113707C9-7A50-4C37-95CB-244D8428F348}"/>
-              </a:ext>
-            </a:extLst>
-          </p:cNvPr>
-          <p:cNvGraphicFramePr>
-            <a:graphicFrameLocks noGrp="1"/>
-          </p:cNvGraphicFramePr>
-          <p:nvPr>
-            <p:extLst>
-              <p:ext uri="{D42A27DB-BD31-4B8C-83A1-F6EECF244321}">
-                <p14:modId xmlns:p14="http://schemas.microsoft.com/office/powerpoint/2010/main" val="3865422884"/>
-              </p:ext>
-            </p:extLst>
-          </p:nvPr>
-        </p:nvGraphicFramePr>
-        <p:xfrm>
-          <a:off x="1402269" y="3446575"/>
-          <a:ext cx="7113900" cy="318284"/>
-        </p:xfrm>
-        <a:graphic>
-          <a:graphicData uri="http://schemas.openxmlformats.org/drawingml/2006/table">
-            <a:tbl>
-              <a:tblPr firstRow="1" bandRow="1">
-                <a:tableStyleId>{775DCB02-9BB8-47FD-8907-85C794F793BA}</a:tableStyleId>
-              </a:tblPr>
-              <a:tblGrid>
-                <a:gridCol w="2371300">
-                  <a:extLst>
-                    <a:ext uri="{9D8B030D-6E8A-4147-A177-3AD203B41FA5}">
-                      <a16:colId xmlns:a16="http://schemas.microsoft.com/office/drawing/2014/main" val="1250263218"/>
-                    </a:ext>
-                  </a:extLst>
-                </a:gridCol>
-                <a:gridCol w="2371300">
-                  <a:extLst>
-                    <a:ext uri="{9D8B030D-6E8A-4147-A177-3AD203B41FA5}">
-                      <a16:colId xmlns:a16="http://schemas.microsoft.com/office/drawing/2014/main" val="2902916699"/>
-                    </a:ext>
-                  </a:extLst>
-                </a:gridCol>
-                <a:gridCol w="2371300">
-                  <a:extLst>
-                    <a:ext uri="{9D8B030D-6E8A-4147-A177-3AD203B41FA5}">
-                      <a16:colId xmlns:a16="http://schemas.microsoft.com/office/drawing/2014/main" val="2064578966"/>
-                    </a:ext>
-                  </a:extLst>
-                </a:gridCol>
-              </a:tblGrid>
-              <a:tr h="318284">
-                <a:tc>
-                  <a:txBody>
-                    <a:bodyPr/>
-                    <a:lstStyle/>
-                    <a:p>
-                      <a:pPr algn="ctr" latinLnBrk="1"/>
-                      <a:r>
-                        <a:rPr lang="ko-KR" altLang="en-US" sz="1400" b="1" dirty="0"/>
-                        <a:t>그룹 수정</a:t>
-                      </a:r>
-                    </a:p>
-                  </a:txBody>
-                  <a:tcPr>
-                    <a:noFill/>
-                  </a:tcPr>
-                </a:tc>
-                <a:tc>
-                  <a:txBody>
-                    <a:bodyPr/>
-                    <a:lstStyle/>
-                    <a:p>
-                      <a:pPr algn="ctr" latinLnBrk="1"/>
-                      <a:r>
-                        <a:rPr lang="ko-KR" altLang="en-US" sz="1400" b="1" dirty="0"/>
-                        <a:t>게시판</a:t>
-                      </a:r>
-                    </a:p>
-                  </a:txBody>
-                  <a:tcPr>
-                    <a:solidFill>
-                      <a:srgbClr val="FFC000"/>
-                    </a:solidFill>
-                  </a:tcPr>
-                </a:tc>
-                <a:tc>
-                  <a:txBody>
-                    <a:bodyPr/>
-                    <a:lstStyle/>
-                    <a:p>
-                      <a:pPr algn="ctr" latinLnBrk="1"/>
-                      <a:r>
-                        <a:rPr lang="ko-KR" altLang="en-US" sz="1400" b="1" dirty="0"/>
-                        <a:t>그룹원관리</a:t>
-                      </a:r>
-                    </a:p>
-                  </a:txBody>
-                  <a:tcPr>
-                    <a:noFill/>
-                  </a:tcPr>
-                </a:tc>
-                <a:extLst>
-                  <a:ext uri="{0D108BD9-81ED-4DB2-BD59-A6C34878D82A}">
-                    <a16:rowId xmlns:a16="http://schemas.microsoft.com/office/drawing/2014/main" val="1655162773"/>
-                  </a:ext>
-                </a:extLst>
-              </a:tr>
-            </a:tbl>
-          </a:graphicData>
-        </a:graphic>
-      </p:graphicFrame>
-      <p:graphicFrame>
-        <p:nvGraphicFramePr>
-          <p:cNvPr id="30" name="표 2">
-            <a:extLst>
-              <a:ext uri="{FF2B5EF4-FFF2-40B4-BE49-F238E27FC236}">
-                <a16:creationId xmlns:a16="http://schemas.microsoft.com/office/drawing/2014/main" id="{5FF28B29-F971-4240-AA63-DFDB88AB2B9B}"/>
-              </a:ext>
-            </a:extLst>
-          </p:cNvPr>
-          <p:cNvGraphicFramePr>
-            <a:graphicFrameLocks noGrp="1"/>
-          </p:cNvGraphicFramePr>
-          <p:nvPr>
-            <p:extLst>
-              <p:ext uri="{D42A27DB-BD31-4B8C-83A1-F6EECF244321}">
-                <p14:modId xmlns:p14="http://schemas.microsoft.com/office/powerpoint/2010/main" val="2851618799"/>
-              </p:ext>
-            </p:extLst>
-          </p:nvPr>
-        </p:nvGraphicFramePr>
-        <p:xfrm>
-          <a:off x="1624527" y="3967573"/>
-          <a:ext cx="9152330" cy="2002116"/>
-        </p:xfrm>
-        <a:graphic>
-          <a:graphicData uri="http://schemas.openxmlformats.org/drawingml/2006/table">
-            <a:tbl>
-              <a:tblPr firstRow="1" bandRow="1">
-                <a:tableStyleId>{D27102A9-8310-4765-A935-A1911B00CA55}</a:tableStyleId>
-              </a:tblPr>
-              <a:tblGrid>
-                <a:gridCol w="2172594">
-                  <a:extLst>
-                    <a:ext uri="{9D8B030D-6E8A-4147-A177-3AD203B41FA5}">
-                      <a16:colId xmlns:a16="http://schemas.microsoft.com/office/drawing/2014/main" val="215400847"/>
-                    </a:ext>
-                  </a:extLst>
-                </a:gridCol>
-                <a:gridCol w="6979736">
-                  <a:extLst>
-                    <a:ext uri="{9D8B030D-6E8A-4147-A177-3AD203B41FA5}">
-                      <a16:colId xmlns:a16="http://schemas.microsoft.com/office/drawing/2014/main" val="2666341767"/>
-                    </a:ext>
-                  </a:extLst>
-                </a:gridCol>
-              </a:tblGrid>
-              <a:tr h="667372">
-                <a:tc>
-                  <a:txBody>
-                    <a:bodyPr/>
-                    <a:lstStyle/>
-                    <a:p>
-                      <a:pPr algn="ctr" latinLnBrk="1"/>
-                      <a:r>
-                        <a:rPr lang="ko-KR" altLang="en-US" sz="1100" dirty="0"/>
-                        <a:t>게시판 명 </a:t>
-                      </a:r>
-                    </a:p>
-                  </a:txBody>
-                  <a:tcPr anchor="ctr"/>
-                </a:tc>
-                <a:tc>
-                  <a:txBody>
-                    <a:bodyPr/>
-                    <a:lstStyle/>
-                    <a:p>
-                      <a:pPr algn="ctr" latinLnBrk="1"/>
-                      <a:r>
-                        <a:rPr lang="ko-KR" altLang="en-US" sz="1100" dirty="0"/>
-                        <a:t>자유게시판</a:t>
-                      </a:r>
-                    </a:p>
-                  </a:txBody>
-                  <a:tcPr anchor="ctr"/>
-                </a:tc>
-                <a:extLst>
-                  <a:ext uri="{0D108BD9-81ED-4DB2-BD59-A6C34878D82A}">
-                    <a16:rowId xmlns:a16="http://schemas.microsoft.com/office/drawing/2014/main" val="3674311876"/>
-                  </a:ext>
-                </a:extLst>
-              </a:tr>
-              <a:tr h="667372">
-                <a:tc>
-                  <a:txBody>
-                    <a:bodyPr/>
-                    <a:lstStyle/>
-                    <a:p>
-                      <a:pPr algn="ctr" latinLnBrk="1"/>
-                      <a:r>
-                        <a:rPr lang="ko-KR" altLang="en-US" sz="1100" b="1" dirty="0"/>
-                        <a:t>공개 설정</a:t>
-                      </a:r>
-                    </a:p>
-                  </a:txBody>
-                  <a:tcPr anchor="ctr"/>
-                </a:tc>
-                <a:tc>
-                  <a:txBody>
-                    <a:bodyPr/>
-                    <a:lstStyle/>
-                    <a:p>
-                      <a:pPr algn="ctr" latinLnBrk="1"/>
-                      <a:r>
-                        <a:rPr lang="en-US" altLang="ko-KR" sz="1100" dirty="0"/>
-                        <a:t>Public      Private</a:t>
-                      </a:r>
-                      <a:r>
-                        <a:rPr lang="ko-KR" altLang="en-US" sz="1100" dirty="0"/>
-                        <a:t> </a:t>
-                      </a:r>
-                    </a:p>
-                  </a:txBody>
-                  <a:tcPr anchor="ctr"/>
-                </a:tc>
-                <a:extLst>
-                  <a:ext uri="{0D108BD9-81ED-4DB2-BD59-A6C34878D82A}">
-                    <a16:rowId xmlns:a16="http://schemas.microsoft.com/office/drawing/2014/main" val="3680400248"/>
-                  </a:ext>
-                </a:extLst>
-              </a:tr>
-              <a:tr h="667372">
-                <a:tc>
-                  <a:txBody>
-                    <a:bodyPr/>
-                    <a:lstStyle/>
-                    <a:p>
-                      <a:pPr algn="ctr" latinLnBrk="1"/>
-                      <a:r>
-                        <a:rPr lang="ko-KR" altLang="en-US" sz="1100" b="1" dirty="0"/>
-                        <a:t>게시판 삭제</a:t>
-                      </a:r>
-                    </a:p>
-                  </a:txBody>
-                  <a:tcPr anchor="ctr"/>
-                </a:tc>
-                <a:tc>
-                  <a:txBody>
-                    <a:bodyPr/>
-                    <a:lstStyle/>
-                    <a:p>
-                      <a:pPr algn="ctr" latinLnBrk="1"/>
-                      <a:endParaRPr lang="ko-KR" altLang="en-US" sz="1100" dirty="0"/>
-                    </a:p>
-                  </a:txBody>
-                  <a:tcPr anchor="ctr"/>
-                </a:tc>
-                <a:extLst>
-                  <a:ext uri="{0D108BD9-81ED-4DB2-BD59-A6C34878D82A}">
-                    <a16:rowId xmlns:a16="http://schemas.microsoft.com/office/drawing/2014/main" val="723112192"/>
-                  </a:ext>
-                </a:extLst>
-              </a:tr>
-            </a:tbl>
-          </a:graphicData>
-        </a:graphic>
-      </p:graphicFrame>
-      <p:sp>
-        <p:nvSpPr>
-          <p:cNvPr id="32" name="타원 31">
-            <a:extLst>
-              <a:ext uri="{FF2B5EF4-FFF2-40B4-BE49-F238E27FC236}">
-                <a16:creationId xmlns:a16="http://schemas.microsoft.com/office/drawing/2014/main" id="{4DD2665D-B531-4CB9-BB29-095B1FC434ED}"/>
-              </a:ext>
-            </a:extLst>
-          </p:cNvPr>
-          <p:cNvSpPr/>
-          <p:nvPr/>
-        </p:nvSpPr>
-        <p:spPr>
-          <a:xfrm>
-            <a:off x="7152280" y="4899335"/>
-            <a:ext cx="152400" cy="160866"/>
-          </a:xfrm>
-          <a:prstGeom prst="ellipse">
-            <a:avLst/>
-          </a:prstGeom>
-        </p:spPr>
-        <p:style>
-          <a:lnRef idx="2">
-            <a:schemeClr val="accent4"/>
-          </a:lnRef>
-          <a:fillRef idx="1">
-            <a:schemeClr val="lt1"/>
-          </a:fillRef>
-          <a:effectRef idx="0">
-            <a:schemeClr val="accent4"/>
-          </a:effectRef>
-          <a:fontRef idx="minor">
-            <a:schemeClr val="dk1"/>
-          </a:fontRef>
-        </p:style>
-        <p:txBody>
-          <a:bodyPr rtlCol="0" anchor="ctr"/>
-          <a:lstStyle/>
-          <a:p>
-            <a:pPr algn="ctr"/>
-            <a:endParaRPr lang="ko-KR" altLang="en-US"/>
-          </a:p>
-        </p:txBody>
-      </p:sp>
-      <p:sp>
-        <p:nvSpPr>
-          <p:cNvPr id="33" name="타원 32">
-            <a:extLst>
-              <a:ext uri="{FF2B5EF4-FFF2-40B4-BE49-F238E27FC236}">
-                <a16:creationId xmlns:a16="http://schemas.microsoft.com/office/drawing/2014/main" id="{449C7292-40A3-4607-BE25-FF5F2EBD1899}"/>
-              </a:ext>
-            </a:extLst>
-          </p:cNvPr>
-          <p:cNvSpPr/>
-          <p:nvPr/>
-        </p:nvSpPr>
-        <p:spPr>
-          <a:xfrm>
-            <a:off x="7185617" y="4934524"/>
-            <a:ext cx="85725" cy="90487"/>
-          </a:xfrm>
-          <a:prstGeom prst="ellipse">
-            <a:avLst/>
-          </a:prstGeom>
-        </p:spPr>
-        <p:style>
-          <a:lnRef idx="1">
-            <a:schemeClr val="accent5"/>
-          </a:lnRef>
-          <a:fillRef idx="3">
-            <a:schemeClr val="accent5"/>
-          </a:fillRef>
-          <a:effectRef idx="2">
-            <a:schemeClr val="accent5"/>
-          </a:effectRef>
-          <a:fontRef idx="minor">
-            <a:schemeClr val="lt1"/>
-          </a:fontRef>
-        </p:style>
-        <p:txBody>
-          <a:bodyPr rtlCol="0" anchor="ctr"/>
-          <a:lstStyle/>
-          <a:p>
-            <a:pPr algn="ctr"/>
-            <a:endParaRPr lang="ko-KR" altLang="en-US"/>
-          </a:p>
-        </p:txBody>
-      </p:sp>
-      <p:sp>
-        <p:nvSpPr>
-          <p:cNvPr id="34" name="타원 33">
-            <a:extLst>
-              <a:ext uri="{FF2B5EF4-FFF2-40B4-BE49-F238E27FC236}">
-                <a16:creationId xmlns:a16="http://schemas.microsoft.com/office/drawing/2014/main" id="{83069A71-AF1E-4F38-B66A-1EF7D699F05E}"/>
-              </a:ext>
-            </a:extLst>
-          </p:cNvPr>
-          <p:cNvSpPr/>
-          <p:nvPr/>
-        </p:nvSpPr>
-        <p:spPr>
-          <a:xfrm>
-            <a:off x="7933330" y="4899335"/>
-            <a:ext cx="152400" cy="160866"/>
-          </a:xfrm>
-          <a:prstGeom prst="ellipse">
-            <a:avLst/>
-          </a:prstGeom>
-        </p:spPr>
-        <p:style>
-          <a:lnRef idx="2">
-            <a:schemeClr val="accent4"/>
-          </a:lnRef>
-          <a:fillRef idx="1">
-            <a:schemeClr val="lt1"/>
-          </a:fillRef>
-          <a:effectRef idx="0">
-            <a:schemeClr val="accent4"/>
-          </a:effectRef>
-          <a:fontRef idx="minor">
-            <a:schemeClr val="dk1"/>
-          </a:fontRef>
-        </p:style>
-        <p:txBody>
-          <a:bodyPr rtlCol="0" anchor="ctr"/>
-          <a:lstStyle/>
-          <a:p>
-            <a:pPr algn="ctr"/>
-            <a:endParaRPr lang="ko-KR" altLang="en-US"/>
-          </a:p>
-        </p:txBody>
-      </p:sp>
-      <p:sp>
-        <p:nvSpPr>
-          <p:cNvPr id="35" name="직사각형 34">
-            <a:extLst>
-              <a:ext uri="{FF2B5EF4-FFF2-40B4-BE49-F238E27FC236}">
-                <a16:creationId xmlns:a16="http://schemas.microsoft.com/office/drawing/2014/main" id="{9FF39AF1-4810-4027-A1C3-AC7B957B4283}"/>
-              </a:ext>
-            </a:extLst>
-          </p:cNvPr>
-          <p:cNvSpPr/>
-          <p:nvPr/>
-        </p:nvSpPr>
-        <p:spPr>
-          <a:xfrm>
-            <a:off x="4924665" y="3768386"/>
-            <a:ext cx="1215887" cy="601519"/>
-          </a:xfrm>
-          <a:prstGeom prst="rect">
-            <a:avLst/>
-          </a:prstGeom>
-          <a:solidFill>
-            <a:schemeClr val="bg1">
-              <a:lumMod val="95000"/>
-            </a:schemeClr>
-          </a:solidFill>
-          <a:effectLst>
-            <a:outerShdw blurRad="50800" dist="38100" dir="2700000" algn="tl" rotWithShape="0">
-              <a:prstClr val="black">
-                <a:alpha val="40000"/>
-              </a:prstClr>
-            </a:outerShdw>
-          </a:effectLst>
-        </p:spPr>
-        <p:style>
-          <a:lnRef idx="2">
-            <a:schemeClr val="accent3">
-              <a:shade val="50000"/>
-            </a:schemeClr>
-          </a:lnRef>
-          <a:fillRef idx="1">
-            <a:schemeClr val="accent3"/>
-          </a:fillRef>
-          <a:effectRef idx="0">
-            <a:schemeClr val="accent3"/>
-          </a:effectRef>
-          <a:fontRef idx="minor">
-            <a:schemeClr val="lt1"/>
-          </a:fontRef>
-        </p:style>
-        <p:txBody>
-          <a:bodyPr rtlCol="0" anchor="t"/>
-          <a:lstStyle/>
-          <a:p>
-            <a:pPr marL="342900" indent="-342900">
-              <a:buAutoNum type="arabicPeriod"/>
-            </a:pPr>
-            <a:r>
-              <a:rPr lang="ko-KR" altLang="en-US" sz="1050" b="1" dirty="0">
-                <a:solidFill>
-                  <a:schemeClr val="tx1"/>
-                </a:solidFill>
-              </a:rPr>
-              <a:t>자유게시판</a:t>
-            </a:r>
-            <a:endParaRPr lang="en-US" altLang="ko-KR" sz="1050" b="1" dirty="0">
-              <a:solidFill>
-                <a:schemeClr val="tx1"/>
-              </a:solidFill>
-            </a:endParaRPr>
-          </a:p>
-          <a:p>
-            <a:pPr marL="342900" indent="-342900">
-              <a:buAutoNum type="arabicPeriod"/>
-            </a:pPr>
-            <a:r>
-              <a:rPr lang="ko-KR" altLang="en-US" sz="1050" dirty="0">
-                <a:solidFill>
-                  <a:schemeClr val="tx1"/>
-                </a:solidFill>
-              </a:rPr>
-              <a:t>질문게시판</a:t>
-            </a:r>
-            <a:endParaRPr lang="en-US" altLang="ko-KR" sz="1050" dirty="0">
-              <a:solidFill>
-                <a:schemeClr val="tx1"/>
-              </a:solidFill>
-            </a:endParaRPr>
-          </a:p>
-          <a:p>
-            <a:pPr marL="342900" indent="-342900">
-              <a:buAutoNum type="arabicPeriod"/>
-            </a:pPr>
-            <a:r>
-              <a:rPr lang="en-US" altLang="ko-KR" sz="1050" dirty="0">
-                <a:solidFill>
-                  <a:schemeClr val="tx1"/>
-                </a:solidFill>
-              </a:rPr>
-              <a:t>…</a:t>
-            </a:r>
-          </a:p>
-          <a:p>
-            <a:pPr marL="342900" indent="-342900">
-              <a:buAutoNum type="arabicPeriod"/>
-            </a:pPr>
-            <a:endParaRPr lang="ko-KR" altLang="en-US" sz="1050" dirty="0">
-              <a:solidFill>
-                <a:schemeClr val="tx1"/>
-              </a:solidFill>
-            </a:endParaRPr>
-          </a:p>
-        </p:txBody>
-      </p:sp>
-      <p:sp>
-        <p:nvSpPr>
-          <p:cNvPr id="36" name="TextBox 35">
-            <a:extLst>
-              <a:ext uri="{FF2B5EF4-FFF2-40B4-BE49-F238E27FC236}">
-                <a16:creationId xmlns:a16="http://schemas.microsoft.com/office/drawing/2014/main" id="{E400A6C3-26F5-49BB-AD92-33794D2C87CD}"/>
-              </a:ext>
-            </a:extLst>
-          </p:cNvPr>
-          <p:cNvSpPr txBox="1"/>
-          <p:nvPr/>
-        </p:nvSpPr>
-        <p:spPr>
-          <a:xfrm>
-            <a:off x="6647184" y="5521416"/>
-            <a:ext cx="1461052" cy="276999"/>
-          </a:xfrm>
-          <a:prstGeom prst="rect">
-            <a:avLst/>
-          </a:prstGeom>
-        </p:spPr>
-        <p:style>
-          <a:lnRef idx="2">
-            <a:schemeClr val="accent1"/>
-          </a:lnRef>
-          <a:fillRef idx="1">
-            <a:schemeClr val="lt1"/>
-          </a:fillRef>
-          <a:effectRef idx="0">
-            <a:schemeClr val="accent1"/>
-          </a:effectRef>
-          <a:fontRef idx="minor">
-            <a:schemeClr val="dk1"/>
-          </a:fontRef>
-        </p:style>
-        <p:txBody>
-          <a:bodyPr wrap="square" rtlCol="0">
-            <a:spAutoFit/>
-          </a:bodyPr>
-          <a:lstStyle/>
-          <a:p>
-            <a:r>
-              <a:rPr lang="ko-KR" altLang="en-US" sz="1200" b="1" dirty="0">
-                <a:solidFill>
-                  <a:schemeClr val="bg1">
-                    <a:lumMod val="65000"/>
-                  </a:schemeClr>
-                </a:solidFill>
-              </a:rPr>
-              <a:t>게시판 명</a:t>
-            </a:r>
-            <a:endParaRPr lang="en-US" altLang="ko-KR" sz="1200" b="1" dirty="0">
-              <a:solidFill>
-                <a:schemeClr val="bg1">
-                  <a:lumMod val="65000"/>
-                </a:schemeClr>
-              </a:solidFill>
-            </a:endParaRPr>
-          </a:p>
-        </p:txBody>
-      </p:sp>
-      <p:sp>
-        <p:nvSpPr>
-          <p:cNvPr id="37" name="직사각형 36">
-            <a:extLst>
-              <a:ext uri="{FF2B5EF4-FFF2-40B4-BE49-F238E27FC236}">
-                <a16:creationId xmlns:a16="http://schemas.microsoft.com/office/drawing/2014/main" id="{6A4D4D6E-D88A-405F-9743-96C36ABB479B}"/>
-              </a:ext>
-            </a:extLst>
-          </p:cNvPr>
-          <p:cNvSpPr/>
-          <p:nvPr/>
-        </p:nvSpPr>
-        <p:spPr>
-          <a:xfrm>
-            <a:off x="8468294" y="5521416"/>
-            <a:ext cx="680168" cy="300446"/>
-          </a:xfrm>
-          <a:prstGeom prst="rect">
-            <a:avLst/>
-          </a:prstGeom>
-          <a:solidFill>
-            <a:schemeClr val="accent2"/>
-          </a:solidFill>
-          <a:ln>
-            <a:noFill/>
-          </a:ln>
-        </p:spPr>
-        <p:style>
-          <a:lnRef idx="0">
-            <a:scrgbClr r="0" g="0" b="0"/>
-          </a:lnRef>
-          <a:fillRef idx="0">
-            <a:scrgbClr r="0" g="0" b="0"/>
-          </a:fillRef>
-          <a:effectRef idx="0">
-            <a:scrgbClr r="0" g="0" b="0"/>
-          </a:effectRef>
-          <a:fontRef idx="minor">
-            <a:schemeClr val="lt1"/>
-          </a:fontRef>
-        </p:style>
-        <p:txBody>
-          <a:bodyPr rtlCol="0" anchor="ctr"/>
-          <a:lstStyle/>
-          <a:p>
-            <a:pPr algn="ctr"/>
-            <a:r>
-              <a:rPr lang="ko-KR" altLang="en-US" sz="1200" b="1" dirty="0"/>
-              <a:t>삭제</a:t>
-            </a:r>
-          </a:p>
-        </p:txBody>
-      </p:sp>
-    </p:spTree>
-    <p:extLst>
-      <p:ext uri="{BB962C8B-B14F-4D97-AF65-F5344CB8AC3E}">
-        <p14:creationId xmlns:p14="http://schemas.microsoft.com/office/powerpoint/2010/main" val="1611740374"/>
       </p:ext>
     </p:extLst>
   </p:cSld>

</xml_diff>